<commit_message>
GUI in präsi eingefügt
</commit_message>
<xml_diff>
--- a/doc/CS1/Task11/Präsentation_CS1_Task11.pptx
+++ b/doc/CS1/Task11/Präsentation_CS1_Task11.pptx
@@ -5,17 +5,18 @@
     <p:sldMasterId id="2147483669" r:id="rId4"/>
   </p:sldMasterIdLst>
   <p:notesMasterIdLst>
-    <p:notesMasterId r:id="rId13"/>
+    <p:notesMasterId r:id="rId14"/>
   </p:notesMasterIdLst>
   <p:sldIdLst>
     <p:sldId id="256" r:id="rId5"/>
     <p:sldId id="258" r:id="rId6"/>
     <p:sldId id="261" r:id="rId7"/>
-    <p:sldId id="265" r:id="rId8"/>
-    <p:sldId id="262" r:id="rId9"/>
-    <p:sldId id="264" r:id="rId10"/>
-    <p:sldId id="263" r:id="rId11"/>
-    <p:sldId id="259" r:id="rId12"/>
+    <p:sldId id="266" r:id="rId8"/>
+    <p:sldId id="265" r:id="rId9"/>
+    <p:sldId id="262" r:id="rId10"/>
+    <p:sldId id="264" r:id="rId11"/>
+    <p:sldId id="263" r:id="rId12"/>
+    <p:sldId id="259" r:id="rId13"/>
   </p:sldIdLst>
   <p:sldSz cx="12207875" cy="6858000"/>
   <p:notesSz cx="6797675" cy="9872663"/>
@@ -146,7 +147,7 @@
   </p:defaultTextStyle>
   <p:extLst>
     <p:ext uri="{EFAFB233-063F-42B5-8137-9DF3F51BA10A}">
-      <p15:sldGuideLst xmlns:p15="http://schemas.microsoft.com/office/powerpoint/2012/main">
+      <p15:sldGuideLst xmlns:p15="http://schemas.microsoft.com/office/powerpoint/2012/main" xmlns="">
         <p15:guide id="1" orient="horz" pos="2160">
           <p15:clr>
             <a:srgbClr val="A4A3A4"/>
@@ -164,9 +165,9 @@
 </file>
 
 <file path=ppt/charts/chart1.xml><?xml version="1.0" encoding="utf-8"?>
-<c:chartSpace xmlns:c="http://schemas.openxmlformats.org/drawingml/2006/chart" xmlns:a="http://schemas.openxmlformats.org/drawingml/2006/main" xmlns:r="http://schemas.openxmlformats.org/officeDocument/2006/relationships" xmlns:c16r2="http://schemas.microsoft.com/office/drawing/2015/06/chart">
+<c:chartSpace xmlns:c="http://schemas.openxmlformats.org/drawingml/2006/chart" xmlns:a="http://schemas.openxmlformats.org/drawingml/2006/main" xmlns:r="http://schemas.openxmlformats.org/officeDocument/2006/relationships">
   <c:date1904 val="0"/>
-  <c:lang val="en-US"/>
+  <c:lang val="de-CH"/>
   <c:roundedCorners val="0"/>
   <mc:AlternateContent xmlns:mc="http://schemas.openxmlformats.org/markup-compatibility/2006">
     <mc:Choice xmlns:c14="http://schemas.microsoft.com/office/drawing/2007/8/2/chart" Requires="c14">
@@ -203,6 +204,7 @@
           </a:p>
         </c:rich>
       </c:tx>
+      <c:layout/>
       <c:overlay val="0"/>
       <c:spPr>
         <a:noFill/>
@@ -211,26 +213,6 @@
         </a:ln>
         <a:effectLst/>
       </c:spPr>
-      <c:txPr>
-        <a:bodyPr rot="0" spcFirstLastPara="1" vertOverflow="ellipsis" vert="horz" wrap="square" anchor="ctr" anchorCtr="1"/>
-        <a:lstStyle/>
-        <a:p>
-          <a:pPr>
-            <a:defRPr sz="1400" b="0" i="0" u="none" strike="noStrike" kern="1200" spc="0" baseline="0">
-              <a:solidFill>
-                <a:schemeClr val="tx1">
-                  <a:lumMod val="65000"/>
-                  <a:lumOff val="35000"/>
-                </a:schemeClr>
-              </a:solidFill>
-              <a:latin typeface="+mn-lt"/>
-              <a:ea typeface="+mn-ea"/>
-              <a:cs typeface="+mn-cs"/>
-            </a:defRPr>
-          </a:pPr>
-          <a:endParaRPr lang="en-US"/>
-        </a:p>
-      </c:txPr>
     </c:title>
     <c:autoTitleDeleted val="0"/>
     <c:plotArea>
@@ -283,7 +265,7 @@
                     <a:cs typeface="+mn-cs"/>
                   </a:defRPr>
                 </a:pPr>
-                <a:endParaRPr lang="en-US"/>
+                <a:endParaRPr lang="de-DE"/>
               </a:p>
             </c:txPr>
             <c:dLblPos val="ctr"/>
@@ -294,7 +276,7 @@
             <c:showPercent val="0"/>
             <c:showBubbleSize val="0"/>
             <c:showLeaderLines val="0"/>
-            <c:extLst>
+            <c:extLst xmlns:c16r2="http://schemas.microsoft.com/office/drawing/2015/06/chart">
               <c:ext xmlns:c15="http://schemas.microsoft.com/office/drawing/2012/chart" uri="{CE6537A1-D6FC-4f65-9D91-7224C49458BB}">
                 <c15:showLeaderLines val="1"/>
                 <c15:leaderLines>
@@ -363,7 +345,7 @@
             </c:numRef>
           </c:val>
           <c:smooth val="0"/>
-          <c:extLst>
+          <c:extLst xmlns:c16r2="http://schemas.microsoft.com/office/drawing/2015/06/chart">
             <c:ext xmlns:c16="http://schemas.microsoft.com/office/drawing/2014/chart" uri="{C3380CC4-5D6E-409C-BE32-E72D297353CC}">
               <c16:uniqueId val="{00000000-D45A-4908-A40A-48AF744F6942}"/>
             </c:ext>
@@ -414,7 +396,7 @@
                     <a:cs typeface="+mn-cs"/>
                   </a:defRPr>
                 </a:pPr>
-                <a:endParaRPr lang="en-US"/>
+                <a:endParaRPr lang="de-DE"/>
               </a:p>
             </c:txPr>
             <c:dLblPos val="ctr"/>
@@ -425,7 +407,7 @@
             <c:showPercent val="0"/>
             <c:showBubbleSize val="0"/>
             <c:showLeaderLines val="0"/>
-            <c:extLst>
+            <c:extLst xmlns:c16r2="http://schemas.microsoft.com/office/drawing/2015/06/chart">
               <c:ext xmlns:c15="http://schemas.microsoft.com/office/drawing/2012/chart" uri="{CE6537A1-D6FC-4f65-9D91-7224C49458BB}">
                 <c15:showLeaderLines val="1"/>
                 <c15:leaderLines>
@@ -503,7 +485,7 @@
             </c:numRef>
           </c:val>
           <c:smooth val="0"/>
-          <c:extLst>
+          <c:extLst xmlns:c16r2="http://schemas.microsoft.com/office/drawing/2015/06/chart">
             <c:ext xmlns:c16="http://schemas.microsoft.com/office/drawing/2014/chart" uri="{C3380CC4-5D6E-409C-BE32-E72D297353CC}">
               <c16:uniqueId val="{00000001-D45A-4908-A40A-48AF744F6942}"/>
             </c:ext>
@@ -518,12 +500,13 @@
           <c:showPercent val="0"/>
           <c:showBubbleSize val="0"/>
         </c:dLbls>
+        <c:marker val="1"/>
         <c:smooth val="0"/>
-        <c:axId val="549207312"/>
-        <c:axId val="549207640"/>
+        <c:axId val="150169088"/>
+        <c:axId val="124931456"/>
       </c:lineChart>
       <c:catAx>
-        <c:axId val="549207312"/>
+        <c:axId val="150169088"/>
         <c:scaling>
           <c:orientation val="minMax"/>
         </c:scaling>
@@ -555,6 +538,7 @@
               </a:p>
             </c:rich>
           </c:tx>
+          <c:layout/>
           <c:overlay val="0"/>
           <c:spPr>
             <a:noFill/>
@@ -563,26 +547,6 @@
             </a:ln>
             <a:effectLst/>
           </c:spPr>
-          <c:txPr>
-            <a:bodyPr rot="0" spcFirstLastPara="1" vertOverflow="ellipsis" vert="horz" wrap="square" anchor="ctr" anchorCtr="1"/>
-            <a:lstStyle/>
-            <a:p>
-              <a:pPr>
-                <a:defRPr sz="1000" b="0" i="0" u="none" strike="noStrike" kern="1200" baseline="0">
-                  <a:solidFill>
-                    <a:schemeClr val="tx1">
-                      <a:lumMod val="65000"/>
-                      <a:lumOff val="35000"/>
-                    </a:schemeClr>
-                  </a:solidFill>
-                  <a:latin typeface="+mn-lt"/>
-                  <a:ea typeface="+mn-ea"/>
-                  <a:cs typeface="+mn-cs"/>
-                </a:defRPr>
-              </a:pPr>
-              <a:endParaRPr lang="en-US"/>
-            </a:p>
-          </c:txPr>
         </c:title>
         <c:numFmt formatCode="General" sourceLinked="1"/>
         <c:majorTickMark val="none"/>
@@ -618,10 +582,10 @@
                 <a:cs typeface="+mn-cs"/>
               </a:defRPr>
             </a:pPr>
-            <a:endParaRPr lang="en-US"/>
+            <a:endParaRPr lang="de-DE"/>
           </a:p>
         </c:txPr>
-        <c:crossAx val="549207640"/>
+        <c:crossAx val="124931456"/>
         <c:crosses val="autoZero"/>
         <c:auto val="1"/>
         <c:lblAlgn val="ctr"/>
@@ -629,7 +593,7 @@
         <c:noMultiLvlLbl val="0"/>
       </c:catAx>
       <c:valAx>
-        <c:axId val="549207640"/>
+        <c:axId val="124931456"/>
         <c:scaling>
           <c:orientation val="minMax"/>
         </c:scaling>
@@ -675,6 +639,7 @@
               </a:p>
             </c:rich>
           </c:tx>
+          <c:layout/>
           <c:overlay val="0"/>
           <c:spPr>
             <a:noFill/>
@@ -683,26 +648,6 @@
             </a:ln>
             <a:effectLst/>
           </c:spPr>
-          <c:txPr>
-            <a:bodyPr rot="-5400000" spcFirstLastPara="1" vertOverflow="ellipsis" vert="horz" wrap="square" anchor="ctr" anchorCtr="1"/>
-            <a:lstStyle/>
-            <a:p>
-              <a:pPr>
-                <a:defRPr sz="1000" b="0" i="0" u="none" strike="noStrike" kern="1200" baseline="0">
-                  <a:solidFill>
-                    <a:schemeClr val="tx1">
-                      <a:lumMod val="65000"/>
-                      <a:lumOff val="35000"/>
-                    </a:schemeClr>
-                  </a:solidFill>
-                  <a:latin typeface="+mn-lt"/>
-                  <a:ea typeface="+mn-ea"/>
-                  <a:cs typeface="+mn-cs"/>
-                </a:defRPr>
-              </a:pPr>
-              <a:endParaRPr lang="en-US"/>
-            </a:p>
-          </c:txPr>
         </c:title>
         <c:numFmt formatCode="General" sourceLinked="1"/>
         <c:majorTickMark val="none"/>
@@ -732,10 +677,10 @@
                 <a:cs typeface="+mn-cs"/>
               </a:defRPr>
             </a:pPr>
-            <a:endParaRPr lang="en-US"/>
+            <a:endParaRPr lang="de-DE"/>
           </a:p>
         </c:txPr>
-        <c:crossAx val="549207312"/>
+        <c:crossAx val="150169088"/>
         <c:crosses val="autoZero"/>
         <c:crossBetween val="between"/>
       </c:valAx>
@@ -774,7 +719,7 @@
                 <a:cs typeface="+mn-cs"/>
               </a:defRPr>
             </a:pPr>
-            <a:endParaRPr lang="en-US"/>
+            <a:endParaRPr lang="de-DE"/>
           </a:p>
         </c:txPr>
       </c:dTable>
@@ -788,6 +733,7 @@
     </c:plotArea>
     <c:legend>
       <c:legendPos val="b"/>
+      <c:layout/>
       <c:overlay val="0"/>
       <c:spPr>
         <a:noFill/>
@@ -813,7 +759,7 @@
               <a:cs typeface="+mn-cs"/>
             </a:defRPr>
           </a:pPr>
-          <a:endParaRPr lang="en-US"/>
+          <a:endParaRPr lang="de-DE"/>
         </a:p>
       </c:txPr>
     </c:legend>
@@ -835,10 +781,10 @@
       <a:pPr>
         <a:defRPr/>
       </a:pPr>
-      <a:endParaRPr lang="en-US"/>
+      <a:endParaRPr lang="de-DE"/>
     </a:p>
   </c:txPr>
-  <c:externalData r:id="rId3">
+  <c:externalData r:id="rId1">
     <c:autoUpdate val="0"/>
   </c:externalData>
 </c:chartSpace>
@@ -1660,7 +1606,7 @@
               <a:pPr>
                 <a:defRPr/>
               </a:pPr>
-              <a:t>‹#›</a:t>
+              <a:t>‹Nr.›</a:t>
             </a:fld>
             <a:endParaRPr lang="de-CH"/>
           </a:p>
@@ -2023,15 +1969,15 @@
             <a:noFill/>
           </a:ln>
           <a:extLst>
-            <a:ext uri="{909E8E84-426E-40dd-AFC4-6F175D3DCCD1}">
-              <a14:hiddenFill xmlns:a14="http://schemas.microsoft.com/office/drawing/2010/main" xmlns="">
+            <a:ext uri="{909E8E84-426E-40DD-AFC4-6F175D3DCCD1}">
+              <a14:hiddenFill xmlns:a14="http://schemas.microsoft.com/office/drawing/2010/main">
                 <a:solidFill>
                   <a:srgbClr val="FFFFFF"/>
                 </a:solidFill>
               </a14:hiddenFill>
             </a:ext>
-            <a:ext uri="{91240B29-F687-4f45-9708-019B960494DF}">
-              <a14:hiddenLine xmlns:a14="http://schemas.microsoft.com/office/drawing/2010/main" xmlns="" w="9525">
+            <a:ext uri="{91240B29-F687-4F45-9708-019B960494DF}">
+              <a14:hiddenLine xmlns:a14="http://schemas.microsoft.com/office/drawing/2010/main" w="9525">
                 <a:solidFill>
                   <a:srgbClr val="000000"/>
                 </a:solidFill>
@@ -2081,9 +2027,17 @@
             <a:br>
               <a:rPr lang="de-DE" noProof="0" dirty="0"/>
             </a:br>
+            <a:r>
+              <a:rPr lang="de-DE" noProof="0" dirty="0"/>
+              <a:t/>
+            </a:r>
             <a:br>
               <a:rPr lang="de-DE" noProof="0" dirty="0"/>
             </a:br>
+            <a:r>
+              <a:rPr lang="de-DE" noProof="0" dirty="0"/>
+              <a:t/>
+            </a:r>
             <a:br>
               <a:rPr lang="de-DE" noProof="0" dirty="0"/>
             </a:br>
@@ -3151,7 +3105,7 @@
               <a:pPr>
                 <a:defRPr/>
               </a:pPr>
-              <a:t>‹#›</a:t>
+              <a:t>‹Nr.›</a:t>
             </a:fld>
             <a:endParaRPr lang="de-CH" dirty="0"/>
           </a:p>
@@ -3214,7 +3168,7 @@
               <a:pPr>
                 <a:defRPr/>
               </a:pPr>
-              <a:t>‹#›</a:t>
+              <a:t>‹Nr.›</a:t>
             </a:fld>
             <a:endParaRPr lang="de-CH" dirty="0"/>
           </a:p>
@@ -3519,15 +3473,15 @@
             <a:noFill/>
           </a:ln>
           <a:extLst>
-            <a:ext uri="{909E8E84-426E-40dd-AFC4-6F175D3DCCD1}">
-              <a14:hiddenFill xmlns:a14="http://schemas.microsoft.com/office/drawing/2010/main" xmlns="">
+            <a:ext uri="{909E8E84-426E-40DD-AFC4-6F175D3DCCD1}">
+              <a14:hiddenFill xmlns:a14="http://schemas.microsoft.com/office/drawing/2010/main">
                 <a:solidFill>
                   <a:srgbClr val="FFFFFF"/>
                 </a:solidFill>
               </a14:hiddenFill>
             </a:ext>
-            <a:ext uri="{91240B29-F687-4f45-9708-019B960494DF}">
-              <a14:hiddenLine xmlns:a14="http://schemas.microsoft.com/office/drawing/2010/main" xmlns="" w="9525">
+            <a:ext uri="{91240B29-F687-4F45-9708-019B960494DF}">
+              <a14:hiddenLine xmlns:a14="http://schemas.microsoft.com/office/drawing/2010/main" w="9525">
                 <a:solidFill>
                   <a:srgbClr val="000000"/>
                 </a:solidFill>
@@ -4269,7 +4223,7 @@
               <a:pPr>
                 <a:defRPr/>
               </a:pPr>
-              <a:t>‹#›</a:t>
+              <a:t>‹Nr.›</a:t>
             </a:fld>
             <a:endParaRPr lang="de-CH" dirty="0"/>
           </a:p>
@@ -4668,7 +4622,7 @@
               <a:pPr>
                 <a:defRPr/>
               </a:pPr>
-              <a:t>‹#›</a:t>
+              <a:t>‹Nr.›</a:t>
             </a:fld>
             <a:endParaRPr lang="de-CH" dirty="0"/>
           </a:p>
@@ -4905,7 +4859,7 @@
               <a:pPr>
                 <a:defRPr/>
               </a:pPr>
-              <a:t>‹#›</a:t>
+              <a:t>‹Nr.›</a:t>
             </a:fld>
             <a:endParaRPr lang="de-CH" dirty="0"/>
           </a:p>
@@ -5216,7 +5170,7 @@
               <a:pPr>
                 <a:defRPr/>
               </a:pPr>
-              <a:t>‹#›</a:t>
+              <a:t>‹Nr.›</a:t>
             </a:fld>
             <a:endParaRPr lang="de-CH" dirty="0"/>
           </a:p>
@@ -5749,7 +5703,7 @@
               <a:pPr>
                 <a:defRPr/>
               </a:pPr>
-              <a:t>‹#›</a:t>
+              <a:t>‹Nr.›</a:t>
             </a:fld>
             <a:endParaRPr lang="de-CH" dirty="0"/>
           </a:p>
@@ -6282,7 +6236,7 @@
               <a:pPr>
                 <a:defRPr/>
               </a:pPr>
-              <a:t>‹#›</a:t>
+              <a:t>‹Nr.›</a:t>
             </a:fld>
             <a:endParaRPr lang="de-CH" dirty="0"/>
           </a:p>
@@ -7007,7 +6961,7 @@
               <a:pPr>
                 <a:defRPr/>
               </a:pPr>
-              <a:t>‹#›</a:t>
+              <a:t>‹Nr.›</a:t>
             </a:fld>
             <a:endParaRPr lang="de-CH" dirty="0"/>
           </a:p>
@@ -7072,15 +7026,15 @@
             <a:noFill/>
           </a:ln>
           <a:extLst>
-            <a:ext uri="{909E8E84-426E-40dd-AFC4-6F175D3DCCD1}">
-              <a14:hiddenFill xmlns:a14="http://schemas.microsoft.com/office/drawing/2010/main" xmlns="">
+            <a:ext uri="{909E8E84-426E-40DD-AFC4-6F175D3DCCD1}">
+              <a14:hiddenFill xmlns:a14="http://schemas.microsoft.com/office/drawing/2010/main">
                 <a:solidFill>
                   <a:srgbClr val="FFFFFF"/>
                 </a:solidFill>
               </a14:hiddenFill>
             </a:ext>
-            <a:ext uri="{91240B29-F687-4f45-9708-019B960494DF}">
-              <a14:hiddenLine xmlns:a14="http://schemas.microsoft.com/office/drawing/2010/main" xmlns="" w="9525">
+            <a:ext uri="{91240B29-F687-4F45-9708-019B960494DF}">
+              <a14:hiddenLine xmlns:a14="http://schemas.microsoft.com/office/drawing/2010/main" w="9525">
                 <a:solidFill>
                   <a:srgbClr val="000000"/>
                 </a:solidFill>
@@ -7400,7 +7354,7 @@
               <a:pPr>
                 <a:defRPr/>
               </a:pPr>
-              <a:t>‹#›</a:t>
+              <a:t>‹Nr.›</a:t>
             </a:fld>
             <a:endParaRPr lang="de-CH" dirty="0"/>
           </a:p>
@@ -7855,15 +7809,15 @@
           </a:xfrm>
           <a:noFill/>
           <a:extLst>
-            <a:ext uri="{909E8E84-426E-40dd-AFC4-6F175D3DCCD1}">
-              <a14:hiddenFill xmlns:a14="http://schemas.microsoft.com/office/drawing/2010/main" xmlns="">
+            <a:ext uri="{909E8E84-426E-40DD-AFC4-6F175D3DCCD1}">
+              <a14:hiddenFill xmlns:a14="http://schemas.microsoft.com/office/drawing/2010/main">
                 <a:solidFill>
                   <a:srgbClr val="FFFFFF"/>
                 </a:solidFill>
               </a14:hiddenFill>
             </a:ext>
-            <a:ext uri="{91240B29-F687-4f45-9708-019B960494DF}">
-              <a14:hiddenLine xmlns:a14="http://schemas.microsoft.com/office/drawing/2010/main" xmlns="" w="9525">
+            <a:ext uri="{91240B29-F687-4F45-9708-019B960494DF}">
+              <a14:hiddenLine xmlns:a14="http://schemas.microsoft.com/office/drawing/2010/main" w="9525">
                 <a:solidFill>
                   <a:srgbClr val="000000"/>
                 </a:solidFill>
@@ -7917,15 +7871,15 @@
           </a:xfrm>
           <a:noFill/>
           <a:extLst>
-            <a:ext uri="{909E8E84-426E-40dd-AFC4-6F175D3DCCD1}">
-              <a14:hiddenFill xmlns:a14="http://schemas.microsoft.com/office/drawing/2010/main" xmlns="">
+            <a:ext uri="{909E8E84-426E-40DD-AFC4-6F175D3DCCD1}">
+              <a14:hiddenFill xmlns:a14="http://schemas.microsoft.com/office/drawing/2010/main">
                 <a:solidFill>
                   <a:srgbClr val="FFFFFF"/>
                 </a:solidFill>
               </a14:hiddenFill>
             </a:ext>
-            <a:ext uri="{91240B29-F687-4f45-9708-019B960494DF}">
-              <a14:hiddenLine xmlns:a14="http://schemas.microsoft.com/office/drawing/2010/main" xmlns="" w="9525">
+            <a:ext uri="{91240B29-F687-4F45-9708-019B960494DF}">
+              <a14:hiddenLine xmlns:a14="http://schemas.microsoft.com/office/drawing/2010/main" w="9525">
                 <a:solidFill>
                   <a:srgbClr val="000000"/>
                 </a:solidFill>
@@ -7971,15 +7925,15 @@
           </a:xfrm>
           <a:noFill/>
           <a:extLst>
-            <a:ext uri="{909E8E84-426E-40dd-AFC4-6F175D3DCCD1}">
-              <a14:hiddenFill xmlns:a14="http://schemas.microsoft.com/office/drawing/2010/main" xmlns="">
+            <a:ext uri="{909E8E84-426E-40DD-AFC4-6F175D3DCCD1}">
+              <a14:hiddenFill xmlns:a14="http://schemas.microsoft.com/office/drawing/2010/main">
                 <a:solidFill>
                   <a:srgbClr val="FFFFFF"/>
                 </a:solidFill>
               </a14:hiddenFill>
             </a:ext>
-            <a:ext uri="{91240B29-F687-4f45-9708-019B960494DF}">
-              <a14:hiddenLine xmlns:a14="http://schemas.microsoft.com/office/drawing/2010/main" xmlns="" w="9525">
+            <a:ext uri="{91240B29-F687-4F45-9708-019B960494DF}">
+              <a14:hiddenLine xmlns:a14="http://schemas.microsoft.com/office/drawing/2010/main" w="9525">
                 <a:solidFill>
                   <a:srgbClr val="000000"/>
                 </a:solidFill>
@@ -8086,15 +8040,15 @@
           </a:xfrm>
           <a:noFill/>
           <a:extLst>
-            <a:ext uri="{909E8E84-426E-40dd-AFC4-6F175D3DCCD1}">
-              <a14:hiddenFill xmlns:a14="http://schemas.microsoft.com/office/drawing/2010/main" xmlns="">
+            <a:ext uri="{909E8E84-426E-40DD-AFC4-6F175D3DCCD1}">
+              <a14:hiddenFill xmlns:a14="http://schemas.microsoft.com/office/drawing/2010/main">
                 <a:solidFill>
                   <a:srgbClr val="FFFFFF"/>
                 </a:solidFill>
               </a14:hiddenFill>
             </a:ext>
-            <a:ext uri="{91240B29-F687-4f45-9708-019B960494DF}">
-              <a14:hiddenLine xmlns:a14="http://schemas.microsoft.com/office/drawing/2010/main" xmlns="" w="9525">
+            <a:ext uri="{91240B29-F687-4F45-9708-019B960494DF}">
+              <a14:hiddenLine xmlns:a14="http://schemas.microsoft.com/office/drawing/2010/main" w="9525">
                 <a:solidFill>
                   <a:srgbClr val="000000"/>
                 </a:solidFill>
@@ -8166,15 +8120,15 @@
           </a:xfrm>
           <a:noFill/>
           <a:extLst>
-            <a:ext uri="{909E8E84-426E-40dd-AFC4-6F175D3DCCD1}">
-              <a14:hiddenFill xmlns:a14="http://schemas.microsoft.com/office/drawing/2010/main" xmlns="">
+            <a:ext uri="{909E8E84-426E-40DD-AFC4-6F175D3DCCD1}">
+              <a14:hiddenFill xmlns:a14="http://schemas.microsoft.com/office/drawing/2010/main">
                 <a:solidFill>
                   <a:srgbClr val="FFFFFF"/>
                 </a:solidFill>
               </a14:hiddenFill>
             </a:ext>
-            <a:ext uri="{91240B29-F687-4f45-9708-019B960494DF}">
-              <a14:hiddenLine xmlns:a14="http://schemas.microsoft.com/office/drawing/2010/main" xmlns="" w="9525">
+            <a:ext uri="{91240B29-F687-4F45-9708-019B960494DF}">
+              <a14:hiddenLine xmlns:a14="http://schemas.microsoft.com/office/drawing/2010/main" w="9525">
                 <a:solidFill>
                   <a:srgbClr val="000000"/>
                 </a:solidFill>
@@ -8209,10 +8163,202 @@
   <p:clrMapOvr>
     <a:masterClrMapping/>
   </p:clrMapOvr>
+  <p:timing>
+    <p:tnLst>
+      <p:par>
+        <p:cTn id="1" dur="indefinite" restart="never" nodeType="tmRoot"/>
+      </p:par>
+    </p:tnLst>
+  </p:timing>
 </p:sld>
 </file>
 
 <file path=ppt/slides/slide3.xml><?xml version="1.0" encoding="utf-8"?>
+<p:sld xmlns:a="http://schemas.openxmlformats.org/drawingml/2006/main" xmlns:r="http://schemas.openxmlformats.org/officeDocument/2006/relationships" xmlns:p="http://schemas.openxmlformats.org/presentationml/2006/main">
+  <p:cSld>
+    <p:spTree>
+      <p:nvGrpSpPr>
+        <p:cNvPr id="1" name=""/>
+        <p:cNvGrpSpPr/>
+        <p:nvPr/>
+      </p:nvGrpSpPr>
+      <p:grpSpPr>
+        <a:xfrm>
+          <a:off x="0" y="0"/>
+          <a:ext cx="0" cy="0"/>
+          <a:chOff x="0" y="0"/>
+          <a:chExt cx="0" cy="0"/>
+        </a:xfrm>
+      </p:grpSpPr>
+      <p:sp>
+        <p:nvSpPr>
+          <p:cNvPr id="3" name="Title 2"/>
+          <p:cNvSpPr>
+            <a:spLocks noGrp="1"/>
+          </p:cNvSpPr>
+          <p:nvPr>
+            <p:ph type="ctrTitle"/>
+          </p:nvPr>
+        </p:nvSpPr>
+        <p:spPr/>
+        <p:txBody>
+          <a:bodyPr/>
+          <a:lstStyle/>
+          <a:p>
+            <a:r>
+              <a:rPr lang="en-GB" dirty="0"/>
+              <a:t>Evaluation, </a:t>
+            </a:r>
+            <a:r>
+              <a:rPr lang="en-GB"/>
+              <a:t>GUI design </a:t>
+            </a:r>
+          </a:p>
+        </p:txBody>
+      </p:sp>
+      <p:sp>
+        <p:nvSpPr>
+          <p:cNvPr id="5" name="Inhaltsplatzhalter 4"/>
+          <p:cNvSpPr>
+            <a:spLocks noGrp="1"/>
+          </p:cNvSpPr>
+          <p:nvPr>
+            <p:ph sz="half" idx="1"/>
+          </p:nvPr>
+        </p:nvSpPr>
+        <p:spPr/>
+        <p:txBody>
+          <a:bodyPr/>
+          <a:lstStyle/>
+          <a:p>
+            <a:endParaRPr lang="de-CH" dirty="0"/>
+          </a:p>
+        </p:txBody>
+      </p:sp>
+      <p:pic>
+        <p:nvPicPr>
+          <p:cNvPr id="6" name="Grafik 5"/>
+          <p:cNvPicPr/>
+          <p:nvPr/>
+        </p:nvPicPr>
+        <p:blipFill rotWithShape="1">
+          <a:blip r:embed="rId2"/>
+          <a:srcRect b="16128"/>
+          <a:stretch/>
+        </p:blipFill>
+        <p:spPr>
+          <a:xfrm>
+            <a:off x="1413932" y="900000"/>
+            <a:ext cx="9330267" cy="5483867"/>
+          </a:xfrm>
+          <a:prstGeom prst="rect">
+            <a:avLst/>
+          </a:prstGeom>
+        </p:spPr>
+      </p:pic>
+    </p:spTree>
+    <p:extLst>
+      <p:ext uri="{BB962C8B-B14F-4D97-AF65-F5344CB8AC3E}">
+        <p14:creationId xmlns:p14="http://schemas.microsoft.com/office/powerpoint/2010/main" val="338839171"/>
+      </p:ext>
+    </p:extLst>
+  </p:cSld>
+  <p:clrMapOvr>
+    <a:masterClrMapping/>
+  </p:clrMapOvr>
+  <p:timing>
+    <p:tnLst>
+      <p:par>
+        <p:cTn id="1" dur="indefinite" restart="never" nodeType="tmRoot"/>
+      </p:par>
+    </p:tnLst>
+  </p:timing>
+</p:sld>
+</file>
+
+<file path=ppt/slides/slide4.xml><?xml version="1.0" encoding="utf-8"?>
+<p:sld xmlns:a="http://schemas.openxmlformats.org/drawingml/2006/main" xmlns:r="http://schemas.openxmlformats.org/officeDocument/2006/relationships" xmlns:p="http://schemas.openxmlformats.org/presentationml/2006/main">
+  <p:cSld>
+    <p:spTree>
+      <p:nvGrpSpPr>
+        <p:cNvPr id="1" name=""/>
+        <p:cNvGrpSpPr/>
+        <p:nvPr/>
+      </p:nvGrpSpPr>
+      <p:grpSpPr>
+        <a:xfrm>
+          <a:off x="0" y="0"/>
+          <a:ext cx="0" cy="0"/>
+          <a:chOff x="0" y="0"/>
+          <a:chExt cx="0" cy="0"/>
+        </a:xfrm>
+      </p:grpSpPr>
+      <p:sp>
+        <p:nvSpPr>
+          <p:cNvPr id="3" name="Titel 2"/>
+          <p:cNvSpPr>
+            <a:spLocks noGrp="1"/>
+          </p:cNvSpPr>
+          <p:nvPr>
+            <p:ph type="ctrTitle"/>
+          </p:nvPr>
+        </p:nvSpPr>
+        <p:spPr/>
+        <p:txBody>
+          <a:bodyPr/>
+          <a:lstStyle/>
+          <a:p>
+            <a:endParaRPr lang="de-CH"/>
+          </a:p>
+        </p:txBody>
+      </p:sp>
+      <p:pic>
+        <p:nvPicPr>
+          <p:cNvPr id="4" name="Inhaltsplatzhalter 3"/>
+          <p:cNvPicPr>
+            <a:picLocks noGrp="1"/>
+          </p:cNvPicPr>
+          <p:nvPr>
+            <p:ph sz="half" idx="1"/>
+          </p:nvPr>
+        </p:nvPicPr>
+        <p:blipFill>
+          <a:blip r:embed="rId2"/>
+          <a:stretch>
+            <a:fillRect/>
+          </a:stretch>
+        </p:blipFill>
+        <p:spPr>
+          <a:xfrm>
+            <a:off x="1371600" y="360000"/>
+            <a:ext cx="8830733" cy="5947667"/>
+          </a:xfrm>
+          <a:prstGeom prst="rect">
+            <a:avLst/>
+          </a:prstGeom>
+        </p:spPr>
+      </p:pic>
+    </p:spTree>
+    <p:extLst>
+      <p:ext uri="{BB962C8B-B14F-4D97-AF65-F5344CB8AC3E}">
+        <p14:creationId xmlns:p14="http://schemas.microsoft.com/office/powerpoint/2010/main" val="594283384"/>
+      </p:ext>
+    </p:extLst>
+  </p:cSld>
+  <p:clrMapOvr>
+    <a:masterClrMapping/>
+  </p:clrMapOvr>
+  <p:timing>
+    <p:tnLst>
+      <p:par>
+        <p:cTn id="1" dur="indefinite" restart="never" nodeType="tmRoot"/>
+      </p:par>
+    </p:tnLst>
+  </p:timing>
+</p:sld>
+</file>
+
+<file path=ppt/slides/slide5.xml><?xml version="1.0" encoding="utf-8"?>
 <p:sld xmlns:a="http://schemas.openxmlformats.org/drawingml/2006/main" xmlns:r="http://schemas.openxmlformats.org/officeDocument/2006/relationships" xmlns:p="http://schemas.openxmlformats.org/presentationml/2006/main">
   <p:cSld>
     <p:spTree>
@@ -8244,7 +8390,7 @@
           <a:bodyPr/>
           <a:lstStyle/>
           <a:p>
-            <a:endParaRPr lang="en-GB" dirty="0"/>
+            <a:endParaRPr lang="en-GB"/>
           </a:p>
         </p:txBody>
       </p:sp>
@@ -8265,81 +8411,6 @@
           <a:p>
             <a:r>
               <a:rPr lang="en-GB" dirty="0"/>
-              <a:t>Evaluation, </a:t>
-            </a:r>
-            <a:r>
-              <a:rPr lang="en-GB"/>
-              <a:t>GUI design </a:t>
-            </a:r>
-          </a:p>
-        </p:txBody>
-      </p:sp>
-    </p:spTree>
-    <p:extLst>
-      <p:ext uri="{BB962C8B-B14F-4D97-AF65-F5344CB8AC3E}">
-        <p14:creationId xmlns:p14="http://schemas.microsoft.com/office/powerpoint/2010/main" val="338839171"/>
-      </p:ext>
-    </p:extLst>
-  </p:cSld>
-  <p:clrMapOvr>
-    <a:masterClrMapping/>
-  </p:clrMapOvr>
-</p:sld>
-</file>
-
-<file path=ppt/slides/slide4.xml><?xml version="1.0" encoding="utf-8"?>
-<p:sld xmlns:a="http://schemas.openxmlformats.org/drawingml/2006/main" xmlns:r="http://schemas.openxmlformats.org/officeDocument/2006/relationships" xmlns:p="http://schemas.openxmlformats.org/presentationml/2006/main">
-  <p:cSld>
-    <p:spTree>
-      <p:nvGrpSpPr>
-        <p:cNvPr id="1" name=""/>
-        <p:cNvGrpSpPr/>
-        <p:nvPr/>
-      </p:nvGrpSpPr>
-      <p:grpSpPr>
-        <a:xfrm>
-          <a:off x="0" y="0"/>
-          <a:ext cx="0" cy="0"/>
-          <a:chOff x="0" y="0"/>
-          <a:chExt cx="0" cy="0"/>
-        </a:xfrm>
-      </p:grpSpPr>
-      <p:sp>
-        <p:nvSpPr>
-          <p:cNvPr id="2" name="Content Placeholder 1"/>
-          <p:cNvSpPr>
-            <a:spLocks noGrp="1"/>
-          </p:cNvSpPr>
-          <p:nvPr>
-            <p:ph sz="half" idx="1"/>
-          </p:nvPr>
-        </p:nvSpPr>
-        <p:spPr/>
-        <p:txBody>
-          <a:bodyPr/>
-          <a:lstStyle/>
-          <a:p>
-            <a:endParaRPr lang="en-GB"/>
-          </a:p>
-        </p:txBody>
-      </p:sp>
-      <p:sp>
-        <p:nvSpPr>
-          <p:cNvPr id="3" name="Title 2"/>
-          <p:cNvSpPr>
-            <a:spLocks noGrp="1"/>
-          </p:cNvSpPr>
-          <p:nvPr>
-            <p:ph type="ctrTitle"/>
-          </p:nvPr>
-        </p:nvSpPr>
-        <p:spPr/>
-        <p:txBody>
-          <a:bodyPr/>
-          <a:lstStyle/>
-          <a:p>
-            <a:r>
-              <a:rPr lang="en-GB" dirty="0"/>
               <a:t>Code Design</a:t>
             </a:r>
           </a:p>
@@ -8355,10 +8426,17 @@
   <p:clrMapOvr>
     <a:masterClrMapping/>
   </p:clrMapOvr>
+  <p:timing>
+    <p:tnLst>
+      <p:par>
+        <p:cTn id="1" dur="indefinite" restart="never" nodeType="tmRoot"/>
+      </p:par>
+    </p:tnLst>
+  </p:timing>
 </p:sld>
 </file>
 
-<file path=ppt/slides/slide5.xml><?xml version="1.0" encoding="utf-8"?>
+<file path=ppt/slides/slide6.xml><?xml version="1.0" encoding="utf-8"?>
 <p:sld xmlns:a="http://schemas.openxmlformats.org/drawingml/2006/main" xmlns:r="http://schemas.openxmlformats.org/officeDocument/2006/relationships" xmlns:p="http://schemas.openxmlformats.org/presentationml/2006/main">
   <p:cSld>
     <p:spTree>
@@ -8661,84 +8739,84 @@
                 <a:gridCol w="294306">
                   <a:extLst>
                     <a:ext uri="{9D8B030D-6E8A-4147-A177-3AD203B41FA5}">
-                      <a16:colId xmlns:a16="http://schemas.microsoft.com/office/drawing/2014/main" val="1581582854"/>
+                      <a16:colId xmlns:a16="http://schemas.microsoft.com/office/drawing/2014/main" xmlns="" val="1581582854"/>
                     </a:ext>
                   </a:extLst>
                 </a:gridCol>
                 <a:gridCol w="370608">
                   <a:extLst>
                     <a:ext uri="{9D8B030D-6E8A-4147-A177-3AD203B41FA5}">
-                      <a16:colId xmlns:a16="http://schemas.microsoft.com/office/drawing/2014/main" val="4228139250"/>
+                      <a16:colId xmlns:a16="http://schemas.microsoft.com/office/drawing/2014/main" xmlns="" val="4228139250"/>
                     </a:ext>
                   </a:extLst>
                 </a:gridCol>
                 <a:gridCol w="1199024">
                   <a:extLst>
                     <a:ext uri="{9D8B030D-6E8A-4147-A177-3AD203B41FA5}">
-                      <a16:colId xmlns:a16="http://schemas.microsoft.com/office/drawing/2014/main" val="50605441"/>
+                      <a16:colId xmlns:a16="http://schemas.microsoft.com/office/drawing/2014/main" xmlns="" val="50605441"/>
                     </a:ext>
                   </a:extLst>
                 </a:gridCol>
                 <a:gridCol w="3411768">
                   <a:extLst>
                     <a:ext uri="{9D8B030D-6E8A-4147-A177-3AD203B41FA5}">
-                      <a16:colId xmlns:a16="http://schemas.microsoft.com/office/drawing/2014/main" val="2458272426"/>
+                      <a16:colId xmlns:a16="http://schemas.microsoft.com/office/drawing/2014/main" xmlns="" val="2458272426"/>
                     </a:ext>
                   </a:extLst>
                 </a:gridCol>
                 <a:gridCol w="1635032">
                   <a:extLst>
                     <a:ext uri="{9D8B030D-6E8A-4147-A177-3AD203B41FA5}">
-                      <a16:colId xmlns:a16="http://schemas.microsoft.com/office/drawing/2014/main" val="4087169654"/>
+                      <a16:colId xmlns:a16="http://schemas.microsoft.com/office/drawing/2014/main" xmlns="" val="4087169654"/>
                     </a:ext>
                   </a:extLst>
                 </a:gridCol>
                 <a:gridCol w="872017">
                   <a:extLst>
                     <a:ext uri="{9D8B030D-6E8A-4147-A177-3AD203B41FA5}">
-                      <a16:colId xmlns:a16="http://schemas.microsoft.com/office/drawing/2014/main" val="2272435237"/>
+                      <a16:colId xmlns:a16="http://schemas.microsoft.com/office/drawing/2014/main" xmlns="" val="2272435237"/>
                     </a:ext>
                   </a:extLst>
                 </a:gridCol>
                 <a:gridCol w="588611">
                   <a:extLst>
                     <a:ext uri="{9D8B030D-6E8A-4147-A177-3AD203B41FA5}">
-                      <a16:colId xmlns:a16="http://schemas.microsoft.com/office/drawing/2014/main" val="908593088"/>
+                      <a16:colId xmlns:a16="http://schemas.microsoft.com/office/drawing/2014/main" xmlns="" val="908593088"/>
                     </a:ext>
                   </a:extLst>
                 </a:gridCol>
                 <a:gridCol w="501411">
                   <a:extLst>
                     <a:ext uri="{9D8B030D-6E8A-4147-A177-3AD203B41FA5}">
-                      <a16:colId xmlns:a16="http://schemas.microsoft.com/office/drawing/2014/main" val="2734885908"/>
+                      <a16:colId xmlns:a16="http://schemas.microsoft.com/office/drawing/2014/main" xmlns="" val="2734885908"/>
                     </a:ext>
                   </a:extLst>
                 </a:gridCol>
                 <a:gridCol w="479610">
                   <a:extLst>
                     <a:ext uri="{9D8B030D-6E8A-4147-A177-3AD203B41FA5}">
-                      <a16:colId xmlns:a16="http://schemas.microsoft.com/office/drawing/2014/main" val="2056390426"/>
+                      <a16:colId xmlns:a16="http://schemas.microsoft.com/office/drawing/2014/main" xmlns="" val="2056390426"/>
                     </a:ext>
                   </a:extLst>
                 </a:gridCol>
                 <a:gridCol w="545010">
                   <a:extLst>
                     <a:ext uri="{9D8B030D-6E8A-4147-A177-3AD203B41FA5}">
-                      <a16:colId xmlns:a16="http://schemas.microsoft.com/office/drawing/2014/main" val="2155317258"/>
+                      <a16:colId xmlns:a16="http://schemas.microsoft.com/office/drawing/2014/main" xmlns="" val="2155317258"/>
                     </a:ext>
                   </a:extLst>
                 </a:gridCol>
                 <a:gridCol w="436009">
                   <a:extLst>
                     <a:ext uri="{9D8B030D-6E8A-4147-A177-3AD203B41FA5}">
-                      <a16:colId xmlns:a16="http://schemas.microsoft.com/office/drawing/2014/main" val="2692237743"/>
+                      <a16:colId xmlns:a16="http://schemas.microsoft.com/office/drawing/2014/main" xmlns="" val="2692237743"/>
                     </a:ext>
                   </a:extLst>
                 </a:gridCol>
                 <a:gridCol w="915618">
                   <a:extLst>
                     <a:ext uri="{9D8B030D-6E8A-4147-A177-3AD203B41FA5}">
-                      <a16:colId xmlns:a16="http://schemas.microsoft.com/office/drawing/2014/main" val="752048790"/>
+                      <a16:colId xmlns:a16="http://schemas.microsoft.com/office/drawing/2014/main" xmlns="" val="752048790"/>
                     </a:ext>
                   </a:extLst>
                 </a:gridCol>
@@ -9022,7 +9100,7 @@
                 </a:tc>
                 <a:extLst>
                   <a:ext uri="{0D108BD9-81ED-4DB2-BD59-A6C34878D82A}">
-                    <a16:rowId xmlns:a16="http://schemas.microsoft.com/office/drawing/2014/main" val="299307657"/>
+                    <a16:rowId xmlns:a16="http://schemas.microsoft.com/office/drawing/2014/main" xmlns="" val="299307657"/>
                   </a:ext>
                 </a:extLst>
               </a:tr>
@@ -9305,7 +9383,7 @@
                 </a:tc>
                 <a:extLst>
                   <a:ext uri="{0D108BD9-81ED-4DB2-BD59-A6C34878D82A}">
-                    <a16:rowId xmlns:a16="http://schemas.microsoft.com/office/drawing/2014/main" val="3576684137"/>
+                    <a16:rowId xmlns:a16="http://schemas.microsoft.com/office/drawing/2014/main" xmlns="" val="3576684137"/>
                   </a:ext>
                 </a:extLst>
               </a:tr>
@@ -9588,7 +9666,7 @@
                 </a:tc>
                 <a:extLst>
                   <a:ext uri="{0D108BD9-81ED-4DB2-BD59-A6C34878D82A}">
-                    <a16:rowId xmlns:a16="http://schemas.microsoft.com/office/drawing/2014/main" val="3813577196"/>
+                    <a16:rowId xmlns:a16="http://schemas.microsoft.com/office/drawing/2014/main" xmlns="" val="3813577196"/>
                   </a:ext>
                 </a:extLst>
               </a:tr>
@@ -9871,7 +9949,7 @@
                 </a:tc>
                 <a:extLst>
                   <a:ext uri="{0D108BD9-81ED-4DB2-BD59-A6C34878D82A}">
-                    <a16:rowId xmlns:a16="http://schemas.microsoft.com/office/drawing/2014/main" val="3990546036"/>
+                    <a16:rowId xmlns:a16="http://schemas.microsoft.com/office/drawing/2014/main" xmlns="" val="3990546036"/>
                   </a:ext>
                 </a:extLst>
               </a:tr>
@@ -10154,7 +10232,7 @@
                 </a:tc>
                 <a:extLst>
                   <a:ext uri="{0D108BD9-81ED-4DB2-BD59-A6C34878D82A}">
-                    <a16:rowId xmlns:a16="http://schemas.microsoft.com/office/drawing/2014/main" val="1221227713"/>
+                    <a16:rowId xmlns:a16="http://schemas.microsoft.com/office/drawing/2014/main" xmlns="" val="1221227713"/>
                   </a:ext>
                 </a:extLst>
               </a:tr>
@@ -10172,10 +10250,17 @@
   <p:clrMapOvr>
     <a:masterClrMapping/>
   </p:clrMapOvr>
+  <p:timing>
+    <p:tnLst>
+      <p:par>
+        <p:cTn id="1" dur="indefinite" restart="never" nodeType="tmRoot"/>
+      </p:par>
+    </p:tnLst>
+  </p:timing>
 </p:sld>
 </file>
 
-<file path=ppt/slides/slide6.xml><?xml version="1.0" encoding="utf-8"?>
+<file path=ppt/slides/slide7.xml><?xml version="1.0" encoding="utf-8"?>
 <p:sld xmlns:a="http://schemas.openxmlformats.org/drawingml/2006/main" xmlns:r="http://schemas.openxmlformats.org/officeDocument/2006/relationships" xmlns:p="http://schemas.openxmlformats.org/presentationml/2006/main">
   <p:cSld>
     <p:spTree>
@@ -10241,7 +10326,6 @@
               <a:rPr lang="en-GB" dirty="0"/>
               <a:t>Scrum process – Sprint 1</a:t>
             </a:r>
-            <a:endParaRPr lang="en-GB" dirty="0"/>
           </a:p>
         </p:txBody>
       </p:sp>
@@ -10455,7 +10539,7 @@
           <p:cNvPr id="10" name="Chart 9">
             <a:extLst>
               <a:ext uri="{FF2B5EF4-FFF2-40B4-BE49-F238E27FC236}">
-                <a16:creationId xmlns:a16="http://schemas.microsoft.com/office/drawing/2014/main" id="{97255450-11E7-4F0C-93C8-00E68EF0BB4F}"/>
+                <a16:creationId xmlns:a16="http://schemas.microsoft.com/office/drawing/2014/main" xmlns="" id="{97255450-11E7-4F0C-93C8-00E68EF0BB4F}"/>
               </a:ext>
             </a:extLst>
           </p:cNvPr>
@@ -10632,7 +10716,7 @@
 </p:sld>
 </file>
 
-<file path=ppt/slides/slide7.xml><?xml version="1.0" encoding="utf-8"?>
+<file path=ppt/slides/slide8.xml><?xml version="1.0" encoding="utf-8"?>
 <p:sld xmlns:a="http://schemas.openxmlformats.org/drawingml/2006/main" xmlns:r="http://schemas.openxmlformats.org/officeDocument/2006/relationships" xmlns:p="http://schemas.openxmlformats.org/presentationml/2006/main">
   <p:cSld>
     <p:spTree>
@@ -10736,84 +10820,84 @@
                 <a:gridCol w="294306">
                   <a:extLst>
                     <a:ext uri="{9D8B030D-6E8A-4147-A177-3AD203B41FA5}">
-                      <a16:colId xmlns:a16="http://schemas.microsoft.com/office/drawing/2014/main" val="475861390"/>
+                      <a16:colId xmlns:a16="http://schemas.microsoft.com/office/drawing/2014/main" xmlns="" val="475861390"/>
                     </a:ext>
                   </a:extLst>
                 </a:gridCol>
                 <a:gridCol w="370608">
                   <a:extLst>
                     <a:ext uri="{9D8B030D-6E8A-4147-A177-3AD203B41FA5}">
-                      <a16:colId xmlns:a16="http://schemas.microsoft.com/office/drawing/2014/main" val="1769065204"/>
+                      <a16:colId xmlns:a16="http://schemas.microsoft.com/office/drawing/2014/main" xmlns="" val="1769065204"/>
                     </a:ext>
                   </a:extLst>
                 </a:gridCol>
                 <a:gridCol w="854589">
                   <a:extLst>
                     <a:ext uri="{9D8B030D-6E8A-4147-A177-3AD203B41FA5}">
-                      <a16:colId xmlns:a16="http://schemas.microsoft.com/office/drawing/2014/main" val="3743636707"/>
+                      <a16:colId xmlns:a16="http://schemas.microsoft.com/office/drawing/2014/main" xmlns="" val="3743636707"/>
                     </a:ext>
                   </a:extLst>
                 </a:gridCol>
                 <a:gridCol w="3756203">
                   <a:extLst>
                     <a:ext uri="{9D8B030D-6E8A-4147-A177-3AD203B41FA5}">
-                      <a16:colId xmlns:a16="http://schemas.microsoft.com/office/drawing/2014/main" val="2646478733"/>
+                      <a16:colId xmlns:a16="http://schemas.microsoft.com/office/drawing/2014/main" xmlns="" val="2646478733"/>
                     </a:ext>
                   </a:extLst>
                 </a:gridCol>
                 <a:gridCol w="1635032">
                   <a:extLst>
                     <a:ext uri="{9D8B030D-6E8A-4147-A177-3AD203B41FA5}">
-                      <a16:colId xmlns:a16="http://schemas.microsoft.com/office/drawing/2014/main" val="3805328897"/>
+                      <a16:colId xmlns:a16="http://schemas.microsoft.com/office/drawing/2014/main" xmlns="" val="3805328897"/>
                     </a:ext>
                   </a:extLst>
                 </a:gridCol>
                 <a:gridCol w="872017">
                   <a:extLst>
                     <a:ext uri="{9D8B030D-6E8A-4147-A177-3AD203B41FA5}">
-                      <a16:colId xmlns:a16="http://schemas.microsoft.com/office/drawing/2014/main" val="1477152197"/>
+                      <a16:colId xmlns:a16="http://schemas.microsoft.com/office/drawing/2014/main" xmlns="" val="1477152197"/>
                     </a:ext>
                   </a:extLst>
                 </a:gridCol>
                 <a:gridCol w="588611">
                   <a:extLst>
                     <a:ext uri="{9D8B030D-6E8A-4147-A177-3AD203B41FA5}">
-                      <a16:colId xmlns:a16="http://schemas.microsoft.com/office/drawing/2014/main" val="108243116"/>
+                      <a16:colId xmlns:a16="http://schemas.microsoft.com/office/drawing/2014/main" xmlns="" val="108243116"/>
                     </a:ext>
                   </a:extLst>
                 </a:gridCol>
                 <a:gridCol w="501410">
                   <a:extLst>
                     <a:ext uri="{9D8B030D-6E8A-4147-A177-3AD203B41FA5}">
-                      <a16:colId xmlns:a16="http://schemas.microsoft.com/office/drawing/2014/main" val="835247576"/>
+                      <a16:colId xmlns:a16="http://schemas.microsoft.com/office/drawing/2014/main" xmlns="" val="835247576"/>
                     </a:ext>
                   </a:extLst>
                 </a:gridCol>
                 <a:gridCol w="479610">
                   <a:extLst>
                     <a:ext uri="{9D8B030D-6E8A-4147-A177-3AD203B41FA5}">
-                      <a16:colId xmlns:a16="http://schemas.microsoft.com/office/drawing/2014/main" val="4250152116"/>
+                      <a16:colId xmlns:a16="http://schemas.microsoft.com/office/drawing/2014/main" xmlns="" val="4250152116"/>
                     </a:ext>
                   </a:extLst>
                 </a:gridCol>
                 <a:gridCol w="545011">
                   <a:extLst>
                     <a:ext uri="{9D8B030D-6E8A-4147-A177-3AD203B41FA5}">
-                      <a16:colId xmlns:a16="http://schemas.microsoft.com/office/drawing/2014/main" val="3902149122"/>
+                      <a16:colId xmlns:a16="http://schemas.microsoft.com/office/drawing/2014/main" xmlns="" val="3902149122"/>
                     </a:ext>
                   </a:extLst>
                 </a:gridCol>
                 <a:gridCol w="436009">
                   <a:extLst>
                     <a:ext uri="{9D8B030D-6E8A-4147-A177-3AD203B41FA5}">
-                      <a16:colId xmlns:a16="http://schemas.microsoft.com/office/drawing/2014/main" val="2723395586"/>
+                      <a16:colId xmlns:a16="http://schemas.microsoft.com/office/drawing/2014/main" xmlns="" val="2723395586"/>
                     </a:ext>
                   </a:extLst>
                 </a:gridCol>
                 <a:gridCol w="915619">
                   <a:extLst>
                     <a:ext uri="{9D8B030D-6E8A-4147-A177-3AD203B41FA5}">
-                      <a16:colId xmlns:a16="http://schemas.microsoft.com/office/drawing/2014/main" val="1003722045"/>
+                      <a16:colId xmlns:a16="http://schemas.microsoft.com/office/drawing/2014/main" xmlns="" val="1003722045"/>
                     </a:ext>
                   </a:extLst>
                 </a:gridCol>
@@ -11085,7 +11169,7 @@
                 </a:tc>
                 <a:extLst>
                   <a:ext uri="{0D108BD9-81ED-4DB2-BD59-A6C34878D82A}">
-                    <a16:rowId xmlns:a16="http://schemas.microsoft.com/office/drawing/2014/main" val="114231999"/>
+                    <a16:rowId xmlns:a16="http://schemas.microsoft.com/office/drawing/2014/main" xmlns="" val="114231999"/>
                   </a:ext>
                 </a:extLst>
               </a:tr>
@@ -11356,7 +11440,7 @@
                 </a:tc>
                 <a:extLst>
                   <a:ext uri="{0D108BD9-81ED-4DB2-BD59-A6C34878D82A}">
-                    <a16:rowId xmlns:a16="http://schemas.microsoft.com/office/drawing/2014/main" val="3694202679"/>
+                    <a16:rowId xmlns:a16="http://schemas.microsoft.com/office/drawing/2014/main" xmlns="" val="3694202679"/>
                   </a:ext>
                 </a:extLst>
               </a:tr>
@@ -11627,7 +11711,7 @@
                 </a:tc>
                 <a:extLst>
                   <a:ext uri="{0D108BD9-81ED-4DB2-BD59-A6C34878D82A}">
-                    <a16:rowId xmlns:a16="http://schemas.microsoft.com/office/drawing/2014/main" val="2702129055"/>
+                    <a16:rowId xmlns:a16="http://schemas.microsoft.com/office/drawing/2014/main" xmlns="" val="2702129055"/>
                   </a:ext>
                 </a:extLst>
               </a:tr>
@@ -11898,7 +11982,7 @@
                 </a:tc>
                 <a:extLst>
                   <a:ext uri="{0D108BD9-81ED-4DB2-BD59-A6C34878D82A}">
-                    <a16:rowId xmlns:a16="http://schemas.microsoft.com/office/drawing/2014/main" val="3374135725"/>
+                    <a16:rowId xmlns:a16="http://schemas.microsoft.com/office/drawing/2014/main" xmlns="" val="3374135725"/>
                   </a:ext>
                 </a:extLst>
               </a:tr>
@@ -12169,7 +12253,7 @@
                 </a:tc>
                 <a:extLst>
                   <a:ext uri="{0D108BD9-81ED-4DB2-BD59-A6C34878D82A}">
-                    <a16:rowId xmlns:a16="http://schemas.microsoft.com/office/drawing/2014/main" val="4116588445"/>
+                    <a16:rowId xmlns:a16="http://schemas.microsoft.com/office/drawing/2014/main" xmlns="" val="4116588445"/>
                   </a:ext>
                 </a:extLst>
               </a:tr>
@@ -12440,7 +12524,7 @@
                 </a:tc>
                 <a:extLst>
                   <a:ext uri="{0D108BD9-81ED-4DB2-BD59-A6C34878D82A}">
-                    <a16:rowId xmlns:a16="http://schemas.microsoft.com/office/drawing/2014/main" val="3465428816"/>
+                    <a16:rowId xmlns:a16="http://schemas.microsoft.com/office/drawing/2014/main" xmlns="" val="3465428816"/>
                   </a:ext>
                 </a:extLst>
               </a:tr>
@@ -12675,7 +12759,7 @@
 </p:sld>
 </file>
 
-<file path=ppt/slides/slide8.xml><?xml version="1.0" encoding="utf-8"?>
+<file path=ppt/slides/slide9.xml><?xml version="1.0" encoding="utf-8"?>
 <p:sld xmlns:a="http://schemas.openxmlformats.org/drawingml/2006/main" xmlns:r="http://schemas.openxmlformats.org/officeDocument/2006/relationships" xmlns:p="http://schemas.openxmlformats.org/presentationml/2006/main">
   <p:cSld>
     <p:spTree>
@@ -12709,15 +12793,15 @@
           </a:xfrm>
           <a:noFill/>
           <a:extLst>
-            <a:ext uri="{909E8E84-426E-40dd-AFC4-6F175D3DCCD1}">
-              <a14:hiddenFill xmlns:a14="http://schemas.microsoft.com/office/drawing/2010/main" xmlns="">
+            <a:ext uri="{909E8E84-426E-40DD-AFC4-6F175D3DCCD1}">
+              <a14:hiddenFill xmlns:a14="http://schemas.microsoft.com/office/drawing/2010/main">
                 <a:solidFill>
                   <a:srgbClr val="FFFFFF"/>
                 </a:solidFill>
               </a14:hiddenFill>
             </a:ext>
-            <a:ext uri="{91240B29-F687-4f45-9708-019B960494DF}">
-              <a14:hiddenLine xmlns:a14="http://schemas.microsoft.com/office/drawing/2010/main" xmlns="" w="9525">
+            <a:ext uri="{91240B29-F687-4F45-9708-019B960494DF}">
+              <a14:hiddenLine xmlns:a14="http://schemas.microsoft.com/office/drawing/2010/main" w="9525">
                 <a:solidFill>
                   <a:srgbClr val="000000"/>
                 </a:solidFill>
@@ -12764,15 +12848,15 @@
           </a:xfrm>
           <a:noFill/>
           <a:extLst>
-            <a:ext uri="{909E8E84-426E-40dd-AFC4-6F175D3DCCD1}">
-              <a14:hiddenFill xmlns:a14="http://schemas.microsoft.com/office/drawing/2010/main" xmlns="">
+            <a:ext uri="{909E8E84-426E-40DD-AFC4-6F175D3DCCD1}">
+              <a14:hiddenFill xmlns:a14="http://schemas.microsoft.com/office/drawing/2010/main">
                 <a:solidFill>
                   <a:srgbClr val="FFFFFF"/>
                 </a:solidFill>
               </a14:hiddenFill>
             </a:ext>
-            <a:ext uri="{91240B29-F687-4f45-9708-019B960494DF}">
-              <a14:hiddenLine xmlns:a14="http://schemas.microsoft.com/office/drawing/2010/main" xmlns="" w="9525">
+            <a:ext uri="{91240B29-F687-4F45-9708-019B960494DF}">
+              <a14:hiddenLine xmlns:a14="http://schemas.microsoft.com/office/drawing/2010/main" w="9525">
                 <a:solidFill>
                   <a:srgbClr val="000000"/>
                 </a:solidFill>
@@ -13413,13 +13497,12 @@
 </file>
 
 <file path=customXml/item1.xml><?xml version="1.0" encoding="utf-8"?>
-<p:properties xmlns:p="http://schemas.microsoft.com/office/2006/metadata/properties" xmlns:xsi="http://www.w3.org/2001/XMLSchema-instance">
-  <documentManagement>
-    <Betriebsystem xmlns="238ac175-5152-443e-bf42-417a27926292">Windows/Mac</Betriebsystem>
-    <Office_x002d_Version xmlns="238ac175-5152-443e-bf42-417a27926292">Office 2010/2011</Office_x002d_Version>
-    <Kategorie xmlns="238ac175-5152-443e-bf42-417a27926292">Powerpoint</Kategorie>
-  </documentManagement>
-</p:properties>
+<?mso-contentType ?>
+<FormTemplates xmlns="http://schemas.microsoft.com/sharepoint/v3/contenttype/forms">
+  <Display>DocumentLibraryForm</Display>
+  <Edit>DocumentLibraryForm</Edit>
+  <New>DocumentLibraryForm</New>
+</FormTemplates>
 </file>
 
 <file path=customXml/item2.xml><?xml version="1.0" encoding="utf-8"?>
@@ -13509,25 +13592,19 @@
 </file>
 
 <file path=customXml/item3.xml><?xml version="1.0" encoding="utf-8"?>
-<?mso-contentType ?>
-<FormTemplates xmlns="http://schemas.microsoft.com/sharepoint/v3/contenttype/forms">
-  <Display>DocumentLibraryForm</Display>
-  <Edit>DocumentLibraryForm</Edit>
-  <New>DocumentLibraryForm</New>
-</FormTemplates>
+<p:properties xmlns:p="http://schemas.microsoft.com/office/2006/metadata/properties" xmlns:xsi="http://www.w3.org/2001/XMLSchema-instance">
+  <documentManagement>
+    <Betriebsystem xmlns="238ac175-5152-443e-bf42-417a27926292">Windows/Mac</Betriebsystem>
+    <Office_x002d_Version xmlns="238ac175-5152-443e-bf42-417a27926292">Office 2010/2011</Office_x002d_Version>
+    <Kategorie xmlns="238ac175-5152-443e-bf42-417a27926292">Powerpoint</Kategorie>
+  </documentManagement>
+</p:properties>
 </file>
 
 <file path=customXml/itemProps1.xml><?xml version="1.0" encoding="utf-8"?>
-<ds:datastoreItem xmlns:ds="http://schemas.openxmlformats.org/officeDocument/2006/customXml" ds:itemID="{F09E12DB-F876-4C59-A411-726D3126721E}">
+<ds:datastoreItem xmlns:ds="http://schemas.openxmlformats.org/officeDocument/2006/customXml" ds:itemID="{9CE40E7B-A2C7-4778-9F2A-6D23000DC7D5}">
   <ds:schemaRefs>
-    <ds:schemaRef ds:uri="http://purl.org/dc/dcmitype/"/>
-    <ds:schemaRef ds:uri="http://purl.org/dc/elements/1.1/"/>
-    <ds:schemaRef ds:uri="http://schemas.microsoft.com/office/2006/metadata/properties"/>
-    <ds:schemaRef ds:uri="http://schemas.microsoft.com/office/2006/documentManagement/types"/>
-    <ds:schemaRef ds:uri="238ac175-5152-443e-bf42-417a27926292"/>
-    <ds:schemaRef ds:uri="http://schemas.openxmlformats.org/package/2006/metadata/core-properties"/>
-    <ds:schemaRef ds:uri="http://www.w3.org/XML/1998/namespace"/>
-    <ds:schemaRef ds:uri="http://purl.org/dc/terms/"/>
+    <ds:schemaRef ds:uri="http://schemas.microsoft.com/sharepoint/v3/contenttype/forms"/>
   </ds:schemaRefs>
 </ds:datastoreItem>
 </file>
@@ -13550,9 +13627,16 @@
 </file>
 
 <file path=customXml/itemProps3.xml><?xml version="1.0" encoding="utf-8"?>
-<ds:datastoreItem xmlns:ds="http://schemas.openxmlformats.org/officeDocument/2006/customXml" ds:itemID="{9CE40E7B-A2C7-4778-9F2A-6D23000DC7D5}">
+<ds:datastoreItem xmlns:ds="http://schemas.openxmlformats.org/officeDocument/2006/customXml" ds:itemID="{F09E12DB-F876-4C59-A411-726D3126721E}">
   <ds:schemaRefs>
-    <ds:schemaRef ds:uri="http://schemas.microsoft.com/sharepoint/v3/contenttype/forms"/>
+    <ds:schemaRef ds:uri="http://purl.org/dc/dcmitype/"/>
+    <ds:schemaRef ds:uri="http://purl.org/dc/elements/1.1/"/>
+    <ds:schemaRef ds:uri="http://schemas.openxmlformats.org/package/2006/metadata/core-properties"/>
+    <ds:schemaRef ds:uri="http://schemas.microsoft.com/office/2006/documentManagement/types"/>
+    <ds:schemaRef ds:uri="http://www.w3.org/XML/1998/namespace"/>
+    <ds:schemaRef ds:uri="238ac175-5152-443e-bf42-417a27926292"/>
+    <ds:schemaRef ds:uri="http://schemas.microsoft.com/office/2006/metadata/properties"/>
+    <ds:schemaRef ds:uri="http://purl.org/dc/terms/"/>
   </ds:schemaRefs>
 </ds:datastoreItem>
 </file>
</xml_diff>

<commit_message>
UI Demo direkt aus Eclipse von Meister Jolo
</commit_message>
<xml_diff>
--- a/doc/CS1/Task11/Präsentation_CS1_Task11.pptx
+++ b/doc/CS1/Task11/Präsentation_CS1_Task11.pptx
@@ -5,18 +5,17 @@
     <p:sldMasterId id="2147483669" r:id="rId4"/>
   </p:sldMasterIdLst>
   <p:notesMasterIdLst>
-    <p:notesMasterId r:id="rId14"/>
+    <p:notesMasterId r:id="rId13"/>
   </p:notesMasterIdLst>
   <p:sldIdLst>
     <p:sldId id="256" r:id="rId5"/>
     <p:sldId id="258" r:id="rId6"/>
     <p:sldId id="261" r:id="rId7"/>
-    <p:sldId id="266" r:id="rId8"/>
-    <p:sldId id="265" r:id="rId9"/>
-    <p:sldId id="262" r:id="rId10"/>
-    <p:sldId id="264" r:id="rId11"/>
-    <p:sldId id="263" r:id="rId12"/>
-    <p:sldId id="259" r:id="rId13"/>
+    <p:sldId id="265" r:id="rId8"/>
+    <p:sldId id="262" r:id="rId9"/>
+    <p:sldId id="264" r:id="rId10"/>
+    <p:sldId id="263" r:id="rId11"/>
+    <p:sldId id="259" r:id="rId12"/>
   </p:sldIdLst>
   <p:sldSz cx="12207875" cy="6858000"/>
   <p:notesSz cx="6797675" cy="9872663"/>
@@ -147,7 +146,7 @@
   </p:defaultTextStyle>
   <p:extLst>
     <p:ext uri="{EFAFB233-063F-42B5-8137-9DF3F51BA10A}">
-      <p15:sldGuideLst xmlns:p15="http://schemas.microsoft.com/office/powerpoint/2012/main" xmlns="">
+      <p15:sldGuideLst xmlns:p15="http://schemas.microsoft.com/office/powerpoint/2012/main">
         <p15:guide id="1" orient="horz" pos="2160">
           <p15:clr>
             <a:srgbClr val="A4A3A4"/>
@@ -165,9 +164,9 @@
 </file>
 
 <file path=ppt/charts/chart1.xml><?xml version="1.0" encoding="utf-8"?>
-<c:chartSpace xmlns:c="http://schemas.openxmlformats.org/drawingml/2006/chart" xmlns:a="http://schemas.openxmlformats.org/drawingml/2006/main" xmlns:r="http://schemas.openxmlformats.org/officeDocument/2006/relationships">
+<c:chartSpace xmlns:c="http://schemas.openxmlformats.org/drawingml/2006/chart" xmlns:a="http://schemas.openxmlformats.org/drawingml/2006/main" xmlns:r="http://schemas.openxmlformats.org/officeDocument/2006/relationships" xmlns:c16r2="http://schemas.microsoft.com/office/drawing/2015/06/chart">
   <c:date1904 val="0"/>
-  <c:lang val="de-CH"/>
+  <c:lang val="en-US"/>
   <c:roundedCorners val="0"/>
   <mc:AlternateContent xmlns:mc="http://schemas.openxmlformats.org/markup-compatibility/2006">
     <mc:Choice xmlns:c14="http://schemas.microsoft.com/office/drawing/2007/8/2/chart" Requires="c14">
@@ -204,7 +203,6 @@
           </a:p>
         </c:rich>
       </c:tx>
-      <c:layout/>
       <c:overlay val="0"/>
       <c:spPr>
         <a:noFill/>
@@ -213,6 +211,26 @@
         </a:ln>
         <a:effectLst/>
       </c:spPr>
+      <c:txPr>
+        <a:bodyPr rot="0" spcFirstLastPara="1" vertOverflow="ellipsis" vert="horz" wrap="square" anchor="ctr" anchorCtr="1"/>
+        <a:lstStyle/>
+        <a:p>
+          <a:pPr>
+            <a:defRPr sz="1400" b="0" i="0" u="none" strike="noStrike" kern="1200" spc="0" baseline="0">
+              <a:solidFill>
+                <a:schemeClr val="tx1">
+                  <a:lumMod val="65000"/>
+                  <a:lumOff val="35000"/>
+                </a:schemeClr>
+              </a:solidFill>
+              <a:latin typeface="+mn-lt"/>
+              <a:ea typeface="+mn-ea"/>
+              <a:cs typeface="+mn-cs"/>
+            </a:defRPr>
+          </a:pPr>
+          <a:endParaRPr lang="en-US"/>
+        </a:p>
+      </c:txPr>
     </c:title>
     <c:autoTitleDeleted val="0"/>
     <c:plotArea>
@@ -265,7 +283,7 @@
                     <a:cs typeface="+mn-cs"/>
                   </a:defRPr>
                 </a:pPr>
-                <a:endParaRPr lang="de-DE"/>
+                <a:endParaRPr lang="en-US"/>
               </a:p>
             </c:txPr>
             <c:dLblPos val="ctr"/>
@@ -276,7 +294,7 @@
             <c:showPercent val="0"/>
             <c:showBubbleSize val="0"/>
             <c:showLeaderLines val="0"/>
-            <c:extLst xmlns:c16r2="http://schemas.microsoft.com/office/drawing/2015/06/chart">
+            <c:extLst>
               <c:ext xmlns:c15="http://schemas.microsoft.com/office/drawing/2012/chart" uri="{CE6537A1-D6FC-4f65-9D91-7224C49458BB}">
                 <c15:showLeaderLines val="1"/>
                 <c15:leaderLines>
@@ -345,7 +363,7 @@
             </c:numRef>
           </c:val>
           <c:smooth val="0"/>
-          <c:extLst xmlns:c16r2="http://schemas.microsoft.com/office/drawing/2015/06/chart">
+          <c:extLst>
             <c:ext xmlns:c16="http://schemas.microsoft.com/office/drawing/2014/chart" uri="{C3380CC4-5D6E-409C-BE32-E72D297353CC}">
               <c16:uniqueId val="{00000000-D45A-4908-A40A-48AF744F6942}"/>
             </c:ext>
@@ -396,7 +414,7 @@
                     <a:cs typeface="+mn-cs"/>
                   </a:defRPr>
                 </a:pPr>
-                <a:endParaRPr lang="de-DE"/>
+                <a:endParaRPr lang="en-US"/>
               </a:p>
             </c:txPr>
             <c:dLblPos val="ctr"/>
@@ -407,7 +425,7 @@
             <c:showPercent val="0"/>
             <c:showBubbleSize val="0"/>
             <c:showLeaderLines val="0"/>
-            <c:extLst xmlns:c16r2="http://schemas.microsoft.com/office/drawing/2015/06/chart">
+            <c:extLst>
               <c:ext xmlns:c15="http://schemas.microsoft.com/office/drawing/2012/chart" uri="{CE6537A1-D6FC-4f65-9D91-7224C49458BB}">
                 <c15:showLeaderLines val="1"/>
                 <c15:leaderLines>
@@ -485,7 +503,7 @@
             </c:numRef>
           </c:val>
           <c:smooth val="0"/>
-          <c:extLst xmlns:c16r2="http://schemas.microsoft.com/office/drawing/2015/06/chart">
+          <c:extLst>
             <c:ext xmlns:c16="http://schemas.microsoft.com/office/drawing/2014/chart" uri="{C3380CC4-5D6E-409C-BE32-E72D297353CC}">
               <c16:uniqueId val="{00000001-D45A-4908-A40A-48AF744F6942}"/>
             </c:ext>
@@ -500,7 +518,6 @@
           <c:showPercent val="0"/>
           <c:showBubbleSize val="0"/>
         </c:dLbls>
-        <c:marker val="1"/>
         <c:smooth val="0"/>
         <c:axId val="150169088"/>
         <c:axId val="124931456"/>
@@ -538,7 +555,6 @@
               </a:p>
             </c:rich>
           </c:tx>
-          <c:layout/>
           <c:overlay val="0"/>
           <c:spPr>
             <a:noFill/>
@@ -547,6 +563,26 @@
             </a:ln>
             <a:effectLst/>
           </c:spPr>
+          <c:txPr>
+            <a:bodyPr rot="0" spcFirstLastPara="1" vertOverflow="ellipsis" vert="horz" wrap="square" anchor="ctr" anchorCtr="1"/>
+            <a:lstStyle/>
+            <a:p>
+              <a:pPr>
+                <a:defRPr sz="1000" b="0" i="0" u="none" strike="noStrike" kern="1200" baseline="0">
+                  <a:solidFill>
+                    <a:schemeClr val="tx1">
+                      <a:lumMod val="65000"/>
+                      <a:lumOff val="35000"/>
+                    </a:schemeClr>
+                  </a:solidFill>
+                  <a:latin typeface="+mn-lt"/>
+                  <a:ea typeface="+mn-ea"/>
+                  <a:cs typeface="+mn-cs"/>
+                </a:defRPr>
+              </a:pPr>
+              <a:endParaRPr lang="en-US"/>
+            </a:p>
+          </c:txPr>
         </c:title>
         <c:numFmt formatCode="General" sourceLinked="1"/>
         <c:majorTickMark val="none"/>
@@ -582,7 +618,7 @@
                 <a:cs typeface="+mn-cs"/>
               </a:defRPr>
             </a:pPr>
-            <a:endParaRPr lang="de-DE"/>
+            <a:endParaRPr lang="en-US"/>
           </a:p>
         </c:txPr>
         <c:crossAx val="124931456"/>
@@ -639,7 +675,6 @@
               </a:p>
             </c:rich>
           </c:tx>
-          <c:layout/>
           <c:overlay val="0"/>
           <c:spPr>
             <a:noFill/>
@@ -648,6 +683,26 @@
             </a:ln>
             <a:effectLst/>
           </c:spPr>
+          <c:txPr>
+            <a:bodyPr rot="-5400000" spcFirstLastPara="1" vertOverflow="ellipsis" vert="horz" wrap="square" anchor="ctr" anchorCtr="1"/>
+            <a:lstStyle/>
+            <a:p>
+              <a:pPr>
+                <a:defRPr sz="1000" b="0" i="0" u="none" strike="noStrike" kern="1200" baseline="0">
+                  <a:solidFill>
+                    <a:schemeClr val="tx1">
+                      <a:lumMod val="65000"/>
+                      <a:lumOff val="35000"/>
+                    </a:schemeClr>
+                  </a:solidFill>
+                  <a:latin typeface="+mn-lt"/>
+                  <a:ea typeface="+mn-ea"/>
+                  <a:cs typeface="+mn-cs"/>
+                </a:defRPr>
+              </a:pPr>
+              <a:endParaRPr lang="en-US"/>
+            </a:p>
+          </c:txPr>
         </c:title>
         <c:numFmt formatCode="General" sourceLinked="1"/>
         <c:majorTickMark val="none"/>
@@ -677,7 +732,7 @@
                 <a:cs typeface="+mn-cs"/>
               </a:defRPr>
             </a:pPr>
-            <a:endParaRPr lang="de-DE"/>
+            <a:endParaRPr lang="en-US"/>
           </a:p>
         </c:txPr>
         <c:crossAx val="150169088"/>
@@ -719,7 +774,7 @@
                 <a:cs typeface="+mn-cs"/>
               </a:defRPr>
             </a:pPr>
-            <a:endParaRPr lang="de-DE"/>
+            <a:endParaRPr lang="en-US"/>
           </a:p>
         </c:txPr>
       </c:dTable>
@@ -733,7 +788,6 @@
     </c:plotArea>
     <c:legend>
       <c:legendPos val="b"/>
-      <c:layout/>
       <c:overlay val="0"/>
       <c:spPr>
         <a:noFill/>
@@ -759,7 +813,7 @@
               <a:cs typeface="+mn-cs"/>
             </a:defRPr>
           </a:pPr>
-          <a:endParaRPr lang="de-DE"/>
+          <a:endParaRPr lang="en-US"/>
         </a:p>
       </c:txPr>
     </c:legend>
@@ -781,10 +835,10 @@
       <a:pPr>
         <a:defRPr/>
       </a:pPr>
-      <a:endParaRPr lang="de-DE"/>
+      <a:endParaRPr lang="en-US"/>
     </a:p>
   </c:txPr>
-  <c:externalData r:id="rId1">
+  <c:externalData r:id="rId3">
     <c:autoUpdate val="0"/>
   </c:externalData>
 </c:chartSpace>
@@ -1606,7 +1660,7 @@
               <a:pPr>
                 <a:defRPr/>
               </a:pPr>
-              <a:t>‹Nr.›</a:t>
+              <a:t>‹#›</a:t>
             </a:fld>
             <a:endParaRPr lang="de-CH"/>
           </a:p>
@@ -2027,17 +2081,9 @@
             <a:br>
               <a:rPr lang="de-DE" noProof="0" dirty="0"/>
             </a:br>
-            <a:r>
-              <a:rPr lang="de-DE" noProof="0" dirty="0"/>
-              <a:t/>
-            </a:r>
             <a:br>
               <a:rPr lang="de-DE" noProof="0" dirty="0"/>
             </a:br>
-            <a:r>
-              <a:rPr lang="de-DE" noProof="0" dirty="0"/>
-              <a:t/>
-            </a:r>
             <a:br>
               <a:rPr lang="de-DE" noProof="0" dirty="0"/>
             </a:br>
@@ -3105,7 +3151,7 @@
               <a:pPr>
                 <a:defRPr/>
               </a:pPr>
-              <a:t>‹Nr.›</a:t>
+              <a:t>‹#›</a:t>
             </a:fld>
             <a:endParaRPr lang="de-CH" dirty="0"/>
           </a:p>
@@ -3168,7 +3214,7 @@
               <a:pPr>
                 <a:defRPr/>
               </a:pPr>
-              <a:t>‹Nr.›</a:t>
+              <a:t>‹#›</a:t>
             </a:fld>
             <a:endParaRPr lang="de-CH" dirty="0"/>
           </a:p>
@@ -4223,7 +4269,7 @@
               <a:pPr>
                 <a:defRPr/>
               </a:pPr>
-              <a:t>‹Nr.›</a:t>
+              <a:t>‹#›</a:t>
             </a:fld>
             <a:endParaRPr lang="de-CH" dirty="0"/>
           </a:p>
@@ -4622,7 +4668,7 @@
               <a:pPr>
                 <a:defRPr/>
               </a:pPr>
-              <a:t>‹Nr.›</a:t>
+              <a:t>‹#›</a:t>
             </a:fld>
             <a:endParaRPr lang="de-CH" dirty="0"/>
           </a:p>
@@ -4859,7 +4905,7 @@
               <a:pPr>
                 <a:defRPr/>
               </a:pPr>
-              <a:t>‹Nr.›</a:t>
+              <a:t>‹#›</a:t>
             </a:fld>
             <a:endParaRPr lang="de-CH" dirty="0"/>
           </a:p>
@@ -5170,7 +5216,7 @@
               <a:pPr>
                 <a:defRPr/>
               </a:pPr>
-              <a:t>‹Nr.›</a:t>
+              <a:t>‹#›</a:t>
             </a:fld>
             <a:endParaRPr lang="de-CH" dirty="0"/>
           </a:p>
@@ -5703,7 +5749,7 @@
               <a:pPr>
                 <a:defRPr/>
               </a:pPr>
-              <a:t>‹Nr.›</a:t>
+              <a:t>‹#›</a:t>
             </a:fld>
             <a:endParaRPr lang="de-CH" dirty="0"/>
           </a:p>
@@ -6236,7 +6282,7 @@
               <a:pPr>
                 <a:defRPr/>
               </a:pPr>
-              <a:t>‹Nr.›</a:t>
+              <a:t>‹#›</a:t>
             </a:fld>
             <a:endParaRPr lang="de-CH" dirty="0"/>
           </a:p>
@@ -6961,7 +7007,7 @@
               <a:pPr>
                 <a:defRPr/>
               </a:pPr>
-              <a:t>‹Nr.›</a:t>
+              <a:t>‹#›</a:t>
             </a:fld>
             <a:endParaRPr lang="de-CH" dirty="0"/>
           </a:p>
@@ -7354,7 +7400,7 @@
               <a:pPr>
                 <a:defRPr/>
               </a:pPr>
-              <a:t>‹Nr.›</a:t>
+              <a:t>‹#›</a:t>
             </a:fld>
             <a:endParaRPr lang="de-CH" dirty="0"/>
           </a:p>
@@ -8163,13 +8209,6 @@
   <p:clrMapOvr>
     <a:masterClrMapping/>
   </p:clrMapOvr>
-  <p:timing>
-    <p:tnLst>
-      <p:par>
-        <p:cTn id="1" dur="indefinite" restart="never" nodeType="tmRoot"/>
-      </p:par>
-    </p:tnLst>
-  </p:timing>
 </p:sld>
 </file>
 
@@ -8207,11 +8246,7 @@
           <a:p>
             <a:r>
               <a:rPr lang="en-GB" dirty="0"/>
-              <a:t>Evaluation, </a:t>
-            </a:r>
-            <a:r>
-              <a:rPr lang="en-GB"/>
-              <a:t>GUI design </a:t>
+              <a:t>Evaluation, GUI design </a:t>
             </a:r>
           </a:p>
         </p:txBody>
@@ -8231,31 +8266,17 @@
           <a:bodyPr/>
           <a:lstStyle/>
           <a:p>
-            <a:endParaRPr lang="de-CH" dirty="0"/>
+            <a:r>
+              <a:rPr lang="de-CH" dirty="0" err="1"/>
+              <a:t>Vaadin</a:t>
+            </a:r>
+            <a:r>
+              <a:rPr lang="de-CH" dirty="0"/>
+              <a:t> Darstellung</a:t>
+            </a:r>
           </a:p>
         </p:txBody>
       </p:sp>
-      <p:pic>
-        <p:nvPicPr>
-          <p:cNvPr id="6" name="Grafik 5"/>
-          <p:cNvPicPr/>
-          <p:nvPr/>
-        </p:nvPicPr>
-        <p:blipFill rotWithShape="1">
-          <a:blip r:embed="rId2"/>
-          <a:srcRect b="16128"/>
-          <a:stretch/>
-        </p:blipFill>
-        <p:spPr>
-          <a:xfrm>
-            <a:off x="1413932" y="900000"/>
-            <a:ext cx="9330267" cy="5483867"/>
-          </a:xfrm>
-          <a:prstGeom prst="rect">
-            <a:avLst/>
-          </a:prstGeom>
-        </p:spPr>
-      </p:pic>
     </p:spTree>
     <p:extLst>
       <p:ext uri="{BB962C8B-B14F-4D97-AF65-F5344CB8AC3E}">
@@ -8266,99 +8287,10 @@
   <p:clrMapOvr>
     <a:masterClrMapping/>
   </p:clrMapOvr>
-  <p:timing>
-    <p:tnLst>
-      <p:par>
-        <p:cTn id="1" dur="indefinite" restart="never" nodeType="tmRoot"/>
-      </p:par>
-    </p:tnLst>
-  </p:timing>
 </p:sld>
 </file>
 
 <file path=ppt/slides/slide4.xml><?xml version="1.0" encoding="utf-8"?>
-<p:sld xmlns:a="http://schemas.openxmlformats.org/drawingml/2006/main" xmlns:r="http://schemas.openxmlformats.org/officeDocument/2006/relationships" xmlns:p="http://schemas.openxmlformats.org/presentationml/2006/main">
-  <p:cSld>
-    <p:spTree>
-      <p:nvGrpSpPr>
-        <p:cNvPr id="1" name=""/>
-        <p:cNvGrpSpPr/>
-        <p:nvPr/>
-      </p:nvGrpSpPr>
-      <p:grpSpPr>
-        <a:xfrm>
-          <a:off x="0" y="0"/>
-          <a:ext cx="0" cy="0"/>
-          <a:chOff x="0" y="0"/>
-          <a:chExt cx="0" cy="0"/>
-        </a:xfrm>
-      </p:grpSpPr>
-      <p:sp>
-        <p:nvSpPr>
-          <p:cNvPr id="3" name="Titel 2"/>
-          <p:cNvSpPr>
-            <a:spLocks noGrp="1"/>
-          </p:cNvSpPr>
-          <p:nvPr>
-            <p:ph type="ctrTitle"/>
-          </p:nvPr>
-        </p:nvSpPr>
-        <p:spPr/>
-        <p:txBody>
-          <a:bodyPr/>
-          <a:lstStyle/>
-          <a:p>
-            <a:endParaRPr lang="de-CH"/>
-          </a:p>
-        </p:txBody>
-      </p:sp>
-      <p:pic>
-        <p:nvPicPr>
-          <p:cNvPr id="4" name="Inhaltsplatzhalter 3"/>
-          <p:cNvPicPr>
-            <a:picLocks noGrp="1"/>
-          </p:cNvPicPr>
-          <p:nvPr>
-            <p:ph sz="half" idx="1"/>
-          </p:nvPr>
-        </p:nvPicPr>
-        <p:blipFill>
-          <a:blip r:embed="rId2"/>
-          <a:stretch>
-            <a:fillRect/>
-          </a:stretch>
-        </p:blipFill>
-        <p:spPr>
-          <a:xfrm>
-            <a:off x="1371600" y="360000"/>
-            <a:ext cx="8830733" cy="5947667"/>
-          </a:xfrm>
-          <a:prstGeom prst="rect">
-            <a:avLst/>
-          </a:prstGeom>
-        </p:spPr>
-      </p:pic>
-    </p:spTree>
-    <p:extLst>
-      <p:ext uri="{BB962C8B-B14F-4D97-AF65-F5344CB8AC3E}">
-        <p14:creationId xmlns:p14="http://schemas.microsoft.com/office/powerpoint/2010/main" val="594283384"/>
-      </p:ext>
-    </p:extLst>
-  </p:cSld>
-  <p:clrMapOvr>
-    <a:masterClrMapping/>
-  </p:clrMapOvr>
-  <p:timing>
-    <p:tnLst>
-      <p:par>
-        <p:cTn id="1" dur="indefinite" restart="never" nodeType="tmRoot"/>
-      </p:par>
-    </p:tnLst>
-  </p:timing>
-</p:sld>
-</file>
-
-<file path=ppt/slides/slide5.xml><?xml version="1.0" encoding="utf-8"?>
 <p:sld xmlns:a="http://schemas.openxmlformats.org/drawingml/2006/main" xmlns:r="http://schemas.openxmlformats.org/officeDocument/2006/relationships" xmlns:p="http://schemas.openxmlformats.org/presentationml/2006/main">
   <p:cSld>
     <p:spTree>
@@ -8426,17 +8358,10 @@
   <p:clrMapOvr>
     <a:masterClrMapping/>
   </p:clrMapOvr>
-  <p:timing>
-    <p:tnLst>
-      <p:par>
-        <p:cTn id="1" dur="indefinite" restart="never" nodeType="tmRoot"/>
-      </p:par>
-    </p:tnLst>
-  </p:timing>
 </p:sld>
 </file>
 
-<file path=ppt/slides/slide6.xml><?xml version="1.0" encoding="utf-8"?>
+<file path=ppt/slides/slide5.xml><?xml version="1.0" encoding="utf-8"?>
 <p:sld xmlns:a="http://schemas.openxmlformats.org/drawingml/2006/main" xmlns:r="http://schemas.openxmlformats.org/officeDocument/2006/relationships" xmlns:p="http://schemas.openxmlformats.org/presentationml/2006/main">
   <p:cSld>
     <p:spTree>
@@ -8739,84 +8664,84 @@
                 <a:gridCol w="294306">
                   <a:extLst>
                     <a:ext uri="{9D8B030D-6E8A-4147-A177-3AD203B41FA5}">
-                      <a16:colId xmlns:a16="http://schemas.microsoft.com/office/drawing/2014/main" xmlns="" val="1581582854"/>
+                      <a16:colId xmlns:a16="http://schemas.microsoft.com/office/drawing/2014/main" val="1581582854"/>
                     </a:ext>
                   </a:extLst>
                 </a:gridCol>
                 <a:gridCol w="370608">
                   <a:extLst>
                     <a:ext uri="{9D8B030D-6E8A-4147-A177-3AD203B41FA5}">
-                      <a16:colId xmlns:a16="http://schemas.microsoft.com/office/drawing/2014/main" xmlns="" val="4228139250"/>
+                      <a16:colId xmlns:a16="http://schemas.microsoft.com/office/drawing/2014/main" val="4228139250"/>
                     </a:ext>
                   </a:extLst>
                 </a:gridCol>
                 <a:gridCol w="1199024">
                   <a:extLst>
                     <a:ext uri="{9D8B030D-6E8A-4147-A177-3AD203B41FA5}">
-                      <a16:colId xmlns:a16="http://schemas.microsoft.com/office/drawing/2014/main" xmlns="" val="50605441"/>
+                      <a16:colId xmlns:a16="http://schemas.microsoft.com/office/drawing/2014/main" val="50605441"/>
                     </a:ext>
                   </a:extLst>
                 </a:gridCol>
                 <a:gridCol w="3411768">
                   <a:extLst>
                     <a:ext uri="{9D8B030D-6E8A-4147-A177-3AD203B41FA5}">
-                      <a16:colId xmlns:a16="http://schemas.microsoft.com/office/drawing/2014/main" xmlns="" val="2458272426"/>
+                      <a16:colId xmlns:a16="http://schemas.microsoft.com/office/drawing/2014/main" val="2458272426"/>
                     </a:ext>
                   </a:extLst>
                 </a:gridCol>
                 <a:gridCol w="1635032">
                   <a:extLst>
                     <a:ext uri="{9D8B030D-6E8A-4147-A177-3AD203B41FA5}">
-                      <a16:colId xmlns:a16="http://schemas.microsoft.com/office/drawing/2014/main" xmlns="" val="4087169654"/>
+                      <a16:colId xmlns:a16="http://schemas.microsoft.com/office/drawing/2014/main" val="4087169654"/>
                     </a:ext>
                   </a:extLst>
                 </a:gridCol>
                 <a:gridCol w="872017">
                   <a:extLst>
                     <a:ext uri="{9D8B030D-6E8A-4147-A177-3AD203B41FA5}">
-                      <a16:colId xmlns:a16="http://schemas.microsoft.com/office/drawing/2014/main" xmlns="" val="2272435237"/>
+                      <a16:colId xmlns:a16="http://schemas.microsoft.com/office/drawing/2014/main" val="2272435237"/>
                     </a:ext>
                   </a:extLst>
                 </a:gridCol>
                 <a:gridCol w="588611">
                   <a:extLst>
                     <a:ext uri="{9D8B030D-6E8A-4147-A177-3AD203B41FA5}">
-                      <a16:colId xmlns:a16="http://schemas.microsoft.com/office/drawing/2014/main" xmlns="" val="908593088"/>
+                      <a16:colId xmlns:a16="http://schemas.microsoft.com/office/drawing/2014/main" val="908593088"/>
                     </a:ext>
                   </a:extLst>
                 </a:gridCol>
                 <a:gridCol w="501411">
                   <a:extLst>
                     <a:ext uri="{9D8B030D-6E8A-4147-A177-3AD203B41FA5}">
-                      <a16:colId xmlns:a16="http://schemas.microsoft.com/office/drawing/2014/main" xmlns="" val="2734885908"/>
+                      <a16:colId xmlns:a16="http://schemas.microsoft.com/office/drawing/2014/main" val="2734885908"/>
                     </a:ext>
                   </a:extLst>
                 </a:gridCol>
                 <a:gridCol w="479610">
                   <a:extLst>
                     <a:ext uri="{9D8B030D-6E8A-4147-A177-3AD203B41FA5}">
-                      <a16:colId xmlns:a16="http://schemas.microsoft.com/office/drawing/2014/main" xmlns="" val="2056390426"/>
+                      <a16:colId xmlns:a16="http://schemas.microsoft.com/office/drawing/2014/main" val="2056390426"/>
                     </a:ext>
                   </a:extLst>
                 </a:gridCol>
                 <a:gridCol w="545010">
                   <a:extLst>
                     <a:ext uri="{9D8B030D-6E8A-4147-A177-3AD203B41FA5}">
-                      <a16:colId xmlns:a16="http://schemas.microsoft.com/office/drawing/2014/main" xmlns="" val="2155317258"/>
+                      <a16:colId xmlns:a16="http://schemas.microsoft.com/office/drawing/2014/main" val="2155317258"/>
                     </a:ext>
                   </a:extLst>
                 </a:gridCol>
                 <a:gridCol w="436009">
                   <a:extLst>
                     <a:ext uri="{9D8B030D-6E8A-4147-A177-3AD203B41FA5}">
-                      <a16:colId xmlns:a16="http://schemas.microsoft.com/office/drawing/2014/main" xmlns="" val="2692237743"/>
+                      <a16:colId xmlns:a16="http://schemas.microsoft.com/office/drawing/2014/main" val="2692237743"/>
                     </a:ext>
                   </a:extLst>
                 </a:gridCol>
                 <a:gridCol w="915618">
                   <a:extLst>
                     <a:ext uri="{9D8B030D-6E8A-4147-A177-3AD203B41FA5}">
-                      <a16:colId xmlns:a16="http://schemas.microsoft.com/office/drawing/2014/main" xmlns="" val="752048790"/>
+                      <a16:colId xmlns:a16="http://schemas.microsoft.com/office/drawing/2014/main" val="752048790"/>
                     </a:ext>
                   </a:extLst>
                 </a:gridCol>
@@ -9100,7 +9025,7 @@
                 </a:tc>
                 <a:extLst>
                   <a:ext uri="{0D108BD9-81ED-4DB2-BD59-A6C34878D82A}">
-                    <a16:rowId xmlns:a16="http://schemas.microsoft.com/office/drawing/2014/main" xmlns="" val="299307657"/>
+                    <a16:rowId xmlns:a16="http://schemas.microsoft.com/office/drawing/2014/main" val="299307657"/>
                   </a:ext>
                 </a:extLst>
               </a:tr>
@@ -9383,7 +9308,7 @@
                 </a:tc>
                 <a:extLst>
                   <a:ext uri="{0D108BD9-81ED-4DB2-BD59-A6C34878D82A}">
-                    <a16:rowId xmlns:a16="http://schemas.microsoft.com/office/drawing/2014/main" xmlns="" val="3576684137"/>
+                    <a16:rowId xmlns:a16="http://schemas.microsoft.com/office/drawing/2014/main" val="3576684137"/>
                   </a:ext>
                 </a:extLst>
               </a:tr>
@@ -9666,7 +9591,7 @@
                 </a:tc>
                 <a:extLst>
                   <a:ext uri="{0D108BD9-81ED-4DB2-BD59-A6C34878D82A}">
-                    <a16:rowId xmlns:a16="http://schemas.microsoft.com/office/drawing/2014/main" xmlns="" val="3813577196"/>
+                    <a16:rowId xmlns:a16="http://schemas.microsoft.com/office/drawing/2014/main" val="3813577196"/>
                   </a:ext>
                 </a:extLst>
               </a:tr>
@@ -9949,7 +9874,7 @@
                 </a:tc>
                 <a:extLst>
                   <a:ext uri="{0D108BD9-81ED-4DB2-BD59-A6C34878D82A}">
-                    <a16:rowId xmlns:a16="http://schemas.microsoft.com/office/drawing/2014/main" xmlns="" val="3990546036"/>
+                    <a16:rowId xmlns:a16="http://schemas.microsoft.com/office/drawing/2014/main" val="3990546036"/>
                   </a:ext>
                 </a:extLst>
               </a:tr>
@@ -10232,7 +10157,7 @@
                 </a:tc>
                 <a:extLst>
                   <a:ext uri="{0D108BD9-81ED-4DB2-BD59-A6C34878D82A}">
-                    <a16:rowId xmlns:a16="http://schemas.microsoft.com/office/drawing/2014/main" xmlns="" val="1221227713"/>
+                    <a16:rowId xmlns:a16="http://schemas.microsoft.com/office/drawing/2014/main" val="1221227713"/>
                   </a:ext>
                 </a:extLst>
               </a:tr>
@@ -10250,17 +10175,10 @@
   <p:clrMapOvr>
     <a:masterClrMapping/>
   </p:clrMapOvr>
-  <p:timing>
-    <p:tnLst>
-      <p:par>
-        <p:cTn id="1" dur="indefinite" restart="never" nodeType="tmRoot"/>
-      </p:par>
-    </p:tnLst>
-  </p:timing>
 </p:sld>
 </file>
 
-<file path=ppt/slides/slide7.xml><?xml version="1.0" encoding="utf-8"?>
+<file path=ppt/slides/slide6.xml><?xml version="1.0" encoding="utf-8"?>
 <p:sld xmlns:a="http://schemas.openxmlformats.org/drawingml/2006/main" xmlns:r="http://schemas.openxmlformats.org/officeDocument/2006/relationships" xmlns:p="http://schemas.openxmlformats.org/presentationml/2006/main">
   <p:cSld>
     <p:spTree>
@@ -10539,7 +10457,7 @@
           <p:cNvPr id="10" name="Chart 9">
             <a:extLst>
               <a:ext uri="{FF2B5EF4-FFF2-40B4-BE49-F238E27FC236}">
-                <a16:creationId xmlns:a16="http://schemas.microsoft.com/office/drawing/2014/main" xmlns="" id="{97255450-11E7-4F0C-93C8-00E68EF0BB4F}"/>
+                <a16:creationId xmlns:a16="http://schemas.microsoft.com/office/drawing/2014/main" id="{97255450-11E7-4F0C-93C8-00E68EF0BB4F}"/>
               </a:ext>
             </a:extLst>
           </p:cNvPr>
@@ -10716,7 +10634,7 @@
 </p:sld>
 </file>
 
-<file path=ppt/slides/slide8.xml><?xml version="1.0" encoding="utf-8"?>
+<file path=ppt/slides/slide7.xml><?xml version="1.0" encoding="utf-8"?>
 <p:sld xmlns:a="http://schemas.openxmlformats.org/drawingml/2006/main" xmlns:r="http://schemas.openxmlformats.org/officeDocument/2006/relationships" xmlns:p="http://schemas.openxmlformats.org/presentationml/2006/main">
   <p:cSld>
     <p:spTree>
@@ -10820,84 +10738,84 @@
                 <a:gridCol w="294306">
                   <a:extLst>
                     <a:ext uri="{9D8B030D-6E8A-4147-A177-3AD203B41FA5}">
-                      <a16:colId xmlns:a16="http://schemas.microsoft.com/office/drawing/2014/main" xmlns="" val="475861390"/>
+                      <a16:colId xmlns:a16="http://schemas.microsoft.com/office/drawing/2014/main" val="475861390"/>
                     </a:ext>
                   </a:extLst>
                 </a:gridCol>
                 <a:gridCol w="370608">
                   <a:extLst>
                     <a:ext uri="{9D8B030D-6E8A-4147-A177-3AD203B41FA5}">
-                      <a16:colId xmlns:a16="http://schemas.microsoft.com/office/drawing/2014/main" xmlns="" val="1769065204"/>
+                      <a16:colId xmlns:a16="http://schemas.microsoft.com/office/drawing/2014/main" val="1769065204"/>
                     </a:ext>
                   </a:extLst>
                 </a:gridCol>
                 <a:gridCol w="854589">
                   <a:extLst>
                     <a:ext uri="{9D8B030D-6E8A-4147-A177-3AD203B41FA5}">
-                      <a16:colId xmlns:a16="http://schemas.microsoft.com/office/drawing/2014/main" xmlns="" val="3743636707"/>
+                      <a16:colId xmlns:a16="http://schemas.microsoft.com/office/drawing/2014/main" val="3743636707"/>
                     </a:ext>
                   </a:extLst>
                 </a:gridCol>
                 <a:gridCol w="3756203">
                   <a:extLst>
                     <a:ext uri="{9D8B030D-6E8A-4147-A177-3AD203B41FA5}">
-                      <a16:colId xmlns:a16="http://schemas.microsoft.com/office/drawing/2014/main" xmlns="" val="2646478733"/>
+                      <a16:colId xmlns:a16="http://schemas.microsoft.com/office/drawing/2014/main" val="2646478733"/>
                     </a:ext>
                   </a:extLst>
                 </a:gridCol>
                 <a:gridCol w="1635032">
                   <a:extLst>
                     <a:ext uri="{9D8B030D-6E8A-4147-A177-3AD203B41FA5}">
-                      <a16:colId xmlns:a16="http://schemas.microsoft.com/office/drawing/2014/main" xmlns="" val="3805328897"/>
+                      <a16:colId xmlns:a16="http://schemas.microsoft.com/office/drawing/2014/main" val="3805328897"/>
                     </a:ext>
                   </a:extLst>
                 </a:gridCol>
                 <a:gridCol w="872017">
                   <a:extLst>
                     <a:ext uri="{9D8B030D-6E8A-4147-A177-3AD203B41FA5}">
-                      <a16:colId xmlns:a16="http://schemas.microsoft.com/office/drawing/2014/main" xmlns="" val="1477152197"/>
+                      <a16:colId xmlns:a16="http://schemas.microsoft.com/office/drawing/2014/main" val="1477152197"/>
                     </a:ext>
                   </a:extLst>
                 </a:gridCol>
                 <a:gridCol w="588611">
                   <a:extLst>
                     <a:ext uri="{9D8B030D-6E8A-4147-A177-3AD203B41FA5}">
-                      <a16:colId xmlns:a16="http://schemas.microsoft.com/office/drawing/2014/main" xmlns="" val="108243116"/>
+                      <a16:colId xmlns:a16="http://schemas.microsoft.com/office/drawing/2014/main" val="108243116"/>
                     </a:ext>
                   </a:extLst>
                 </a:gridCol>
                 <a:gridCol w="501410">
                   <a:extLst>
                     <a:ext uri="{9D8B030D-6E8A-4147-A177-3AD203B41FA5}">
-                      <a16:colId xmlns:a16="http://schemas.microsoft.com/office/drawing/2014/main" xmlns="" val="835247576"/>
+                      <a16:colId xmlns:a16="http://schemas.microsoft.com/office/drawing/2014/main" val="835247576"/>
                     </a:ext>
                   </a:extLst>
                 </a:gridCol>
                 <a:gridCol w="479610">
                   <a:extLst>
                     <a:ext uri="{9D8B030D-6E8A-4147-A177-3AD203B41FA5}">
-                      <a16:colId xmlns:a16="http://schemas.microsoft.com/office/drawing/2014/main" xmlns="" val="4250152116"/>
+                      <a16:colId xmlns:a16="http://schemas.microsoft.com/office/drawing/2014/main" val="4250152116"/>
                     </a:ext>
                   </a:extLst>
                 </a:gridCol>
                 <a:gridCol w="545011">
                   <a:extLst>
                     <a:ext uri="{9D8B030D-6E8A-4147-A177-3AD203B41FA5}">
-                      <a16:colId xmlns:a16="http://schemas.microsoft.com/office/drawing/2014/main" xmlns="" val="3902149122"/>
+                      <a16:colId xmlns:a16="http://schemas.microsoft.com/office/drawing/2014/main" val="3902149122"/>
                     </a:ext>
                   </a:extLst>
                 </a:gridCol>
                 <a:gridCol w="436009">
                   <a:extLst>
                     <a:ext uri="{9D8B030D-6E8A-4147-A177-3AD203B41FA5}">
-                      <a16:colId xmlns:a16="http://schemas.microsoft.com/office/drawing/2014/main" xmlns="" val="2723395586"/>
+                      <a16:colId xmlns:a16="http://schemas.microsoft.com/office/drawing/2014/main" val="2723395586"/>
                     </a:ext>
                   </a:extLst>
                 </a:gridCol>
                 <a:gridCol w="915619">
                   <a:extLst>
                     <a:ext uri="{9D8B030D-6E8A-4147-A177-3AD203B41FA5}">
-                      <a16:colId xmlns:a16="http://schemas.microsoft.com/office/drawing/2014/main" xmlns="" val="1003722045"/>
+                      <a16:colId xmlns:a16="http://schemas.microsoft.com/office/drawing/2014/main" val="1003722045"/>
                     </a:ext>
                   </a:extLst>
                 </a:gridCol>
@@ -11169,7 +11087,7 @@
                 </a:tc>
                 <a:extLst>
                   <a:ext uri="{0D108BD9-81ED-4DB2-BD59-A6C34878D82A}">
-                    <a16:rowId xmlns:a16="http://schemas.microsoft.com/office/drawing/2014/main" xmlns="" val="114231999"/>
+                    <a16:rowId xmlns:a16="http://schemas.microsoft.com/office/drawing/2014/main" val="114231999"/>
                   </a:ext>
                 </a:extLst>
               </a:tr>
@@ -11440,7 +11358,7 @@
                 </a:tc>
                 <a:extLst>
                   <a:ext uri="{0D108BD9-81ED-4DB2-BD59-A6C34878D82A}">
-                    <a16:rowId xmlns:a16="http://schemas.microsoft.com/office/drawing/2014/main" xmlns="" val="3694202679"/>
+                    <a16:rowId xmlns:a16="http://schemas.microsoft.com/office/drawing/2014/main" val="3694202679"/>
                   </a:ext>
                 </a:extLst>
               </a:tr>
@@ -11711,7 +11629,7 @@
                 </a:tc>
                 <a:extLst>
                   <a:ext uri="{0D108BD9-81ED-4DB2-BD59-A6C34878D82A}">
-                    <a16:rowId xmlns:a16="http://schemas.microsoft.com/office/drawing/2014/main" xmlns="" val="2702129055"/>
+                    <a16:rowId xmlns:a16="http://schemas.microsoft.com/office/drawing/2014/main" val="2702129055"/>
                   </a:ext>
                 </a:extLst>
               </a:tr>
@@ -11982,7 +11900,7 @@
                 </a:tc>
                 <a:extLst>
                   <a:ext uri="{0D108BD9-81ED-4DB2-BD59-A6C34878D82A}">
-                    <a16:rowId xmlns:a16="http://schemas.microsoft.com/office/drawing/2014/main" xmlns="" val="3374135725"/>
+                    <a16:rowId xmlns:a16="http://schemas.microsoft.com/office/drawing/2014/main" val="3374135725"/>
                   </a:ext>
                 </a:extLst>
               </a:tr>
@@ -12253,7 +12171,7 @@
                 </a:tc>
                 <a:extLst>
                   <a:ext uri="{0D108BD9-81ED-4DB2-BD59-A6C34878D82A}">
-                    <a16:rowId xmlns:a16="http://schemas.microsoft.com/office/drawing/2014/main" xmlns="" val="4116588445"/>
+                    <a16:rowId xmlns:a16="http://schemas.microsoft.com/office/drawing/2014/main" val="4116588445"/>
                   </a:ext>
                 </a:extLst>
               </a:tr>
@@ -12524,7 +12442,7 @@
                 </a:tc>
                 <a:extLst>
                   <a:ext uri="{0D108BD9-81ED-4DB2-BD59-A6C34878D82A}">
-                    <a16:rowId xmlns:a16="http://schemas.microsoft.com/office/drawing/2014/main" xmlns="" val="3465428816"/>
+                    <a16:rowId xmlns:a16="http://schemas.microsoft.com/office/drawing/2014/main" val="3465428816"/>
                   </a:ext>
                 </a:extLst>
               </a:tr>
@@ -12759,7 +12677,7 @@
 </p:sld>
 </file>
 
-<file path=ppt/slides/slide9.xml><?xml version="1.0" encoding="utf-8"?>
+<file path=ppt/slides/slide8.xml><?xml version="1.0" encoding="utf-8"?>
 <p:sld xmlns:a="http://schemas.openxmlformats.org/drawingml/2006/main" xmlns:r="http://schemas.openxmlformats.org/officeDocument/2006/relationships" xmlns:p="http://schemas.openxmlformats.org/presentationml/2006/main">
   <p:cSld>
     <p:spTree>
@@ -13497,12 +13415,13 @@
 </file>
 
 <file path=customXml/item1.xml><?xml version="1.0" encoding="utf-8"?>
-<?mso-contentType ?>
-<FormTemplates xmlns="http://schemas.microsoft.com/sharepoint/v3/contenttype/forms">
-  <Display>DocumentLibraryForm</Display>
-  <Edit>DocumentLibraryForm</Edit>
-  <New>DocumentLibraryForm</New>
-</FormTemplates>
+<p:properties xmlns:p="http://schemas.microsoft.com/office/2006/metadata/properties" xmlns:xsi="http://www.w3.org/2001/XMLSchema-instance">
+  <documentManagement>
+    <Betriebsystem xmlns="238ac175-5152-443e-bf42-417a27926292">Windows/Mac</Betriebsystem>
+    <Office_x002d_Version xmlns="238ac175-5152-443e-bf42-417a27926292">Office 2010/2011</Office_x002d_Version>
+    <Kategorie xmlns="238ac175-5152-443e-bf42-417a27926292">Powerpoint</Kategorie>
+  </documentManagement>
+</p:properties>
 </file>
 
 <file path=customXml/item2.xml><?xml version="1.0" encoding="utf-8"?>
@@ -13592,19 +13511,25 @@
 </file>
 
 <file path=customXml/item3.xml><?xml version="1.0" encoding="utf-8"?>
-<p:properties xmlns:p="http://schemas.microsoft.com/office/2006/metadata/properties" xmlns:xsi="http://www.w3.org/2001/XMLSchema-instance">
-  <documentManagement>
-    <Betriebsystem xmlns="238ac175-5152-443e-bf42-417a27926292">Windows/Mac</Betriebsystem>
-    <Office_x002d_Version xmlns="238ac175-5152-443e-bf42-417a27926292">Office 2010/2011</Office_x002d_Version>
-    <Kategorie xmlns="238ac175-5152-443e-bf42-417a27926292">Powerpoint</Kategorie>
-  </documentManagement>
-</p:properties>
+<?mso-contentType ?>
+<FormTemplates xmlns="http://schemas.microsoft.com/sharepoint/v3/contenttype/forms">
+  <Display>DocumentLibraryForm</Display>
+  <Edit>DocumentLibraryForm</Edit>
+  <New>DocumentLibraryForm</New>
+</FormTemplates>
 </file>
 
 <file path=customXml/itemProps1.xml><?xml version="1.0" encoding="utf-8"?>
-<ds:datastoreItem xmlns:ds="http://schemas.openxmlformats.org/officeDocument/2006/customXml" ds:itemID="{9CE40E7B-A2C7-4778-9F2A-6D23000DC7D5}">
+<ds:datastoreItem xmlns:ds="http://schemas.openxmlformats.org/officeDocument/2006/customXml" ds:itemID="{F09E12DB-F876-4C59-A411-726D3126721E}">
   <ds:schemaRefs>
-    <ds:schemaRef ds:uri="http://schemas.microsoft.com/sharepoint/v3/contenttype/forms"/>
+    <ds:schemaRef ds:uri="http://schemas.microsoft.com/office/2006/documentManagement/types"/>
+    <ds:schemaRef ds:uri="http://purl.org/dc/terms/"/>
+    <ds:schemaRef ds:uri="238ac175-5152-443e-bf42-417a27926292"/>
+    <ds:schemaRef ds:uri="http://purl.org/dc/dcmitype/"/>
+    <ds:schemaRef ds:uri="http://purl.org/dc/elements/1.1/"/>
+    <ds:schemaRef ds:uri="http://schemas.microsoft.com/office/2006/metadata/properties"/>
+    <ds:schemaRef ds:uri="http://schemas.openxmlformats.org/package/2006/metadata/core-properties"/>
+    <ds:schemaRef ds:uri="http://www.w3.org/XML/1998/namespace"/>
   </ds:schemaRefs>
 </ds:datastoreItem>
 </file>
@@ -13627,16 +13552,9 @@
 </file>
 
 <file path=customXml/itemProps3.xml><?xml version="1.0" encoding="utf-8"?>
-<ds:datastoreItem xmlns:ds="http://schemas.openxmlformats.org/officeDocument/2006/customXml" ds:itemID="{F09E12DB-F876-4C59-A411-726D3126721E}">
+<ds:datastoreItem xmlns:ds="http://schemas.openxmlformats.org/officeDocument/2006/customXml" ds:itemID="{9CE40E7B-A2C7-4778-9F2A-6D23000DC7D5}">
   <ds:schemaRefs>
-    <ds:schemaRef ds:uri="http://purl.org/dc/dcmitype/"/>
-    <ds:schemaRef ds:uri="http://purl.org/dc/elements/1.1/"/>
-    <ds:schemaRef ds:uri="http://schemas.openxmlformats.org/package/2006/metadata/core-properties"/>
-    <ds:schemaRef ds:uri="http://schemas.microsoft.com/office/2006/documentManagement/types"/>
-    <ds:schemaRef ds:uri="http://www.w3.org/XML/1998/namespace"/>
-    <ds:schemaRef ds:uri="238ac175-5152-443e-bf42-417a27926292"/>
-    <ds:schemaRef ds:uri="http://schemas.microsoft.com/office/2006/metadata/properties"/>
-    <ds:schemaRef ds:uri="http://purl.org/dc/terms/"/>
+    <ds:schemaRef ds:uri="http://schemas.microsoft.com/sharepoint/v3/contenttype/forms"/>
   </ds:schemaRefs>
 </ds:datastoreItem>
 </file>
</xml_diff>